<commit_message>
PowerPoint- Jerry do the Task builder
</commit_message>
<xml_diff>
--- a/Team.Supreme.pptx
+++ b/Team.Supreme.pptx
@@ -5,10 +5,10 @@
     <p:sldMasterId id="2147483648" r:id="rId2"/>
   </p:sldMasterIdLst>
   <p:notesMasterIdLst>
-    <p:notesMasterId r:id="rId16"/>
+    <p:notesMasterId r:id="rId15"/>
   </p:notesMasterIdLst>
   <p:handoutMasterIdLst>
-    <p:handoutMasterId r:id="rId17"/>
+    <p:handoutMasterId r:id="rId16"/>
   </p:handoutMasterIdLst>
   <p:sldIdLst>
     <p:sldId id="256" r:id="rId3"/>
@@ -18,12 +18,11 @@
     <p:sldId id="271" r:id="rId7"/>
     <p:sldId id="272" r:id="rId8"/>
     <p:sldId id="268" r:id="rId9"/>
-    <p:sldId id="258" r:id="rId10"/>
-    <p:sldId id="260" r:id="rId11"/>
-    <p:sldId id="261" r:id="rId12"/>
-    <p:sldId id="262" r:id="rId13"/>
-    <p:sldId id="269" r:id="rId14"/>
-    <p:sldId id="270" r:id="rId15"/>
+    <p:sldId id="273" r:id="rId10"/>
+    <p:sldId id="275" r:id="rId11"/>
+    <p:sldId id="274" r:id="rId12"/>
+    <p:sldId id="258" r:id="rId13"/>
+    <p:sldId id="260" r:id="rId14"/>
   </p:sldIdLst>
   <p:sldSz cx="12192000" cy="6858000"/>
   <p:notesSz cx="6858000" cy="9144000"/>
@@ -4942,32 +4941,2048 @@
             <p:ph type="title"/>
           </p:nvPr>
         </p:nvSpPr>
-        <p:spPr/>
+        <p:spPr>
+          <a:xfrm>
+            <a:off x="1341120" y="467360"/>
+            <a:ext cx="9509760" cy="891540"/>
+          </a:xfrm>
+        </p:spPr>
         <p:txBody>
           <a:bodyPr/>
           <a:lstStyle/>
           <a:p>
-            <a:endParaRPr lang="en-US"/>
-          </a:p>
-        </p:txBody>
-      </p:sp>
+            <a:r>
+              <a:rPr lang="en-US" dirty="0" smtClean="0"/>
+              <a:t>Task Network</a:t>
+            </a:r>
+            <a:endParaRPr lang="en-US" dirty="0"/>
+          </a:p>
+        </p:txBody>
+      </p:sp>
+      <p:sp>
+        <p:nvSpPr>
+          <p:cNvPr id="17" name="Oval 16"/>
+          <p:cNvSpPr/>
+          <p:nvPr/>
+        </p:nvSpPr>
+        <p:spPr>
+          <a:xfrm>
+            <a:off x="0" y="3580130"/>
+            <a:ext cx="901065" cy="706120"/>
+          </a:xfrm>
+          <a:prstGeom prst="ellipse">
+            <a:avLst/>
+          </a:prstGeom>
+        </p:spPr>
+        <p:style>
+          <a:lnRef idx="2">
+            <a:schemeClr val="accent1">
+              <a:shade val="50000"/>
+            </a:schemeClr>
+          </a:lnRef>
+          <a:fillRef idx="1">
+            <a:schemeClr val="accent1"/>
+          </a:fillRef>
+          <a:effectRef idx="0">
+            <a:schemeClr val="accent1"/>
+          </a:effectRef>
+          <a:fontRef idx="minor">
+            <a:schemeClr val="lt1"/>
+          </a:fontRef>
+        </p:style>
+        <p:txBody>
+          <a:bodyPr rtlCol="0" anchor="ctr"/>
+          <a:lstStyle/>
+          <a:p>
+            <a:pPr algn="ctr"/>
+            <a:r>
+              <a:rPr lang="en-US" sz="1600" dirty="0" smtClean="0">
+                <a:solidFill>
+                  <a:schemeClr val="tx1"/>
+                </a:solidFill>
+              </a:rPr>
+              <a:t>Task1</a:t>
+            </a:r>
+            <a:endParaRPr lang="en-US" sz="1600" dirty="0">
+              <a:solidFill>
+                <a:schemeClr val="tx1"/>
+              </a:solidFill>
+            </a:endParaRPr>
+          </a:p>
+        </p:txBody>
+      </p:sp>
+      <p:sp>
+        <p:nvSpPr>
+          <p:cNvPr id="23" name="Oval 22"/>
+          <p:cNvSpPr/>
+          <p:nvPr/>
+        </p:nvSpPr>
+        <p:spPr>
+          <a:xfrm>
+            <a:off x="1001634" y="3580130"/>
+            <a:ext cx="901065" cy="706120"/>
+          </a:xfrm>
+          <a:prstGeom prst="ellipse">
+            <a:avLst/>
+          </a:prstGeom>
+        </p:spPr>
+        <p:style>
+          <a:lnRef idx="2">
+            <a:schemeClr val="accent1">
+              <a:shade val="50000"/>
+            </a:schemeClr>
+          </a:lnRef>
+          <a:fillRef idx="1">
+            <a:schemeClr val="accent1"/>
+          </a:fillRef>
+          <a:effectRef idx="0">
+            <a:schemeClr val="accent1"/>
+          </a:effectRef>
+          <a:fontRef idx="minor">
+            <a:schemeClr val="lt1"/>
+          </a:fontRef>
+        </p:style>
+        <p:txBody>
+          <a:bodyPr rtlCol="0" anchor="ctr"/>
+          <a:lstStyle/>
+          <a:p>
+            <a:pPr algn="ctr"/>
+            <a:r>
+              <a:rPr lang="en-US" sz="1600" dirty="0" smtClean="0">
+                <a:solidFill>
+                  <a:schemeClr val="tx1"/>
+                </a:solidFill>
+              </a:rPr>
+              <a:t>Task2</a:t>
+            </a:r>
+            <a:endParaRPr lang="en-US" sz="1600" dirty="0">
+              <a:solidFill>
+                <a:schemeClr val="tx1"/>
+              </a:solidFill>
+            </a:endParaRPr>
+          </a:p>
+        </p:txBody>
+      </p:sp>
+      <p:sp>
+        <p:nvSpPr>
+          <p:cNvPr id="24" name="Oval 23"/>
+          <p:cNvSpPr/>
+          <p:nvPr/>
+        </p:nvSpPr>
+        <p:spPr>
+          <a:xfrm>
+            <a:off x="2040967" y="4438650"/>
+            <a:ext cx="901065" cy="706120"/>
+          </a:xfrm>
+          <a:prstGeom prst="ellipse">
+            <a:avLst/>
+          </a:prstGeom>
+        </p:spPr>
+        <p:style>
+          <a:lnRef idx="2">
+            <a:schemeClr val="accent1">
+              <a:shade val="50000"/>
+            </a:schemeClr>
+          </a:lnRef>
+          <a:fillRef idx="1">
+            <a:schemeClr val="accent1"/>
+          </a:fillRef>
+          <a:effectRef idx="0">
+            <a:schemeClr val="accent1"/>
+          </a:effectRef>
+          <a:fontRef idx="minor">
+            <a:schemeClr val="lt1"/>
+          </a:fontRef>
+        </p:style>
+        <p:txBody>
+          <a:bodyPr rtlCol="0" anchor="ctr"/>
+          <a:lstStyle/>
+          <a:p>
+            <a:pPr algn="ctr"/>
+            <a:r>
+              <a:rPr lang="en-US" sz="1600" dirty="0" smtClean="0">
+                <a:solidFill>
+                  <a:schemeClr val="tx1"/>
+                </a:solidFill>
+              </a:rPr>
+              <a:t>Task3c</a:t>
+            </a:r>
+            <a:endParaRPr lang="en-US" sz="1600" dirty="0">
+              <a:solidFill>
+                <a:schemeClr val="tx1"/>
+              </a:solidFill>
+            </a:endParaRPr>
+          </a:p>
+        </p:txBody>
+      </p:sp>
+      <p:sp>
+        <p:nvSpPr>
+          <p:cNvPr id="25" name="Oval 24"/>
+          <p:cNvSpPr/>
+          <p:nvPr/>
+        </p:nvSpPr>
+        <p:spPr>
+          <a:xfrm>
+            <a:off x="2040968" y="2788285"/>
+            <a:ext cx="901065" cy="706120"/>
+          </a:xfrm>
+          <a:prstGeom prst="ellipse">
+            <a:avLst/>
+          </a:prstGeom>
+        </p:spPr>
+        <p:style>
+          <a:lnRef idx="2">
+            <a:schemeClr val="accent1">
+              <a:shade val="50000"/>
+            </a:schemeClr>
+          </a:lnRef>
+          <a:fillRef idx="1">
+            <a:schemeClr val="accent1"/>
+          </a:fillRef>
+          <a:effectRef idx="0">
+            <a:schemeClr val="accent1"/>
+          </a:effectRef>
+          <a:fontRef idx="minor">
+            <a:schemeClr val="lt1"/>
+          </a:fontRef>
+        </p:style>
+        <p:txBody>
+          <a:bodyPr rtlCol="0" anchor="ctr"/>
+          <a:lstStyle/>
+          <a:p>
+            <a:pPr algn="ctr"/>
+            <a:r>
+              <a:rPr lang="en-US" sz="1600" dirty="0" smtClean="0">
+                <a:solidFill>
+                  <a:schemeClr val="tx1"/>
+                </a:solidFill>
+              </a:rPr>
+              <a:t>Task3a</a:t>
+            </a:r>
+            <a:endParaRPr lang="en-US" sz="1600" dirty="0">
+              <a:solidFill>
+                <a:schemeClr val="tx1"/>
+              </a:solidFill>
+            </a:endParaRPr>
+          </a:p>
+        </p:txBody>
+      </p:sp>
+      <p:sp>
+        <p:nvSpPr>
+          <p:cNvPr id="26" name="Oval 25"/>
+          <p:cNvSpPr/>
+          <p:nvPr/>
+        </p:nvSpPr>
+        <p:spPr>
+          <a:xfrm>
+            <a:off x="4025899" y="3135630"/>
+            <a:ext cx="901065" cy="706120"/>
+          </a:xfrm>
+          <a:prstGeom prst="ellipse">
+            <a:avLst/>
+          </a:prstGeom>
+        </p:spPr>
+        <p:style>
+          <a:lnRef idx="2">
+            <a:schemeClr val="accent1">
+              <a:shade val="50000"/>
+            </a:schemeClr>
+          </a:lnRef>
+          <a:fillRef idx="1">
+            <a:schemeClr val="accent1"/>
+          </a:fillRef>
+          <a:effectRef idx="0">
+            <a:schemeClr val="accent1"/>
+          </a:effectRef>
+          <a:fontRef idx="minor">
+            <a:schemeClr val="lt1"/>
+          </a:fontRef>
+        </p:style>
+        <p:txBody>
+          <a:bodyPr rtlCol="0" anchor="ctr"/>
+          <a:lstStyle/>
+          <a:p>
+            <a:pPr algn="ctr"/>
+            <a:r>
+              <a:rPr lang="en-US" sz="1600" dirty="0" smtClean="0">
+                <a:solidFill>
+                  <a:schemeClr val="tx1"/>
+                </a:solidFill>
+              </a:rPr>
+              <a:t>Task5a</a:t>
+            </a:r>
+            <a:endParaRPr lang="en-US" sz="1600" dirty="0">
+              <a:solidFill>
+                <a:schemeClr val="tx1"/>
+              </a:solidFill>
+            </a:endParaRPr>
+          </a:p>
+        </p:txBody>
+      </p:sp>
+      <p:sp>
+        <p:nvSpPr>
+          <p:cNvPr id="27" name="Oval 26"/>
+          <p:cNvSpPr/>
+          <p:nvPr/>
+        </p:nvSpPr>
+        <p:spPr>
+          <a:xfrm>
+            <a:off x="5057299" y="4438650"/>
+            <a:ext cx="901065" cy="706120"/>
+          </a:xfrm>
+          <a:prstGeom prst="ellipse">
+            <a:avLst/>
+          </a:prstGeom>
+        </p:spPr>
+        <p:style>
+          <a:lnRef idx="2">
+            <a:schemeClr val="accent1">
+              <a:shade val="50000"/>
+            </a:schemeClr>
+          </a:lnRef>
+          <a:fillRef idx="1">
+            <a:schemeClr val="accent1"/>
+          </a:fillRef>
+          <a:effectRef idx="0">
+            <a:schemeClr val="accent1"/>
+          </a:effectRef>
+          <a:fontRef idx="minor">
+            <a:schemeClr val="lt1"/>
+          </a:fontRef>
+        </p:style>
+        <p:txBody>
+          <a:bodyPr rtlCol="0" anchor="ctr"/>
+          <a:lstStyle/>
+          <a:p>
+            <a:pPr algn="ctr"/>
+            <a:r>
+              <a:rPr lang="en-US" sz="1600" dirty="0" smtClean="0">
+                <a:solidFill>
+                  <a:schemeClr val="tx1"/>
+                </a:solidFill>
+              </a:rPr>
+              <a:t>Task6c</a:t>
+            </a:r>
+            <a:endParaRPr lang="en-US" sz="1600" dirty="0">
+              <a:solidFill>
+                <a:schemeClr val="tx1"/>
+              </a:solidFill>
+            </a:endParaRPr>
+          </a:p>
+        </p:txBody>
+      </p:sp>
+      <p:sp>
+        <p:nvSpPr>
+          <p:cNvPr id="28" name="Oval 27"/>
+          <p:cNvSpPr/>
+          <p:nvPr/>
+        </p:nvSpPr>
+        <p:spPr>
+          <a:xfrm>
+            <a:off x="5089366" y="2788285"/>
+            <a:ext cx="901065" cy="706120"/>
+          </a:xfrm>
+          <a:prstGeom prst="ellipse">
+            <a:avLst/>
+          </a:prstGeom>
+        </p:spPr>
+        <p:style>
+          <a:lnRef idx="2">
+            <a:schemeClr val="accent1">
+              <a:shade val="50000"/>
+            </a:schemeClr>
+          </a:lnRef>
+          <a:fillRef idx="1">
+            <a:schemeClr val="accent1"/>
+          </a:fillRef>
+          <a:effectRef idx="0">
+            <a:schemeClr val="accent1"/>
+          </a:effectRef>
+          <a:fontRef idx="minor">
+            <a:schemeClr val="lt1"/>
+          </a:fontRef>
+        </p:style>
+        <p:txBody>
+          <a:bodyPr rtlCol="0" anchor="ctr"/>
+          <a:lstStyle/>
+          <a:p>
+            <a:pPr algn="ctr"/>
+            <a:r>
+              <a:rPr lang="en-US" sz="1600" dirty="0" smtClean="0">
+                <a:solidFill>
+                  <a:schemeClr val="tx1"/>
+                </a:solidFill>
+              </a:rPr>
+              <a:t>Task6a</a:t>
+            </a:r>
+            <a:endParaRPr lang="en-US" sz="1600" dirty="0">
+              <a:solidFill>
+                <a:schemeClr val="tx1"/>
+              </a:solidFill>
+            </a:endParaRPr>
+          </a:p>
+        </p:txBody>
+      </p:sp>
+      <p:sp>
+        <p:nvSpPr>
+          <p:cNvPr id="29" name="Oval 28"/>
+          <p:cNvSpPr/>
+          <p:nvPr/>
+        </p:nvSpPr>
+        <p:spPr>
+          <a:xfrm>
+            <a:off x="7079933" y="3135630"/>
+            <a:ext cx="901065" cy="706120"/>
+          </a:xfrm>
+          <a:prstGeom prst="ellipse">
+            <a:avLst/>
+          </a:prstGeom>
+        </p:spPr>
+        <p:style>
+          <a:lnRef idx="2">
+            <a:schemeClr val="accent1">
+              <a:shade val="50000"/>
+            </a:schemeClr>
+          </a:lnRef>
+          <a:fillRef idx="1">
+            <a:schemeClr val="accent1"/>
+          </a:fillRef>
+          <a:effectRef idx="0">
+            <a:schemeClr val="accent1"/>
+          </a:effectRef>
+          <a:fontRef idx="minor">
+            <a:schemeClr val="lt1"/>
+          </a:fontRef>
+        </p:style>
+        <p:txBody>
+          <a:bodyPr rtlCol="0" anchor="ctr"/>
+          <a:lstStyle/>
+          <a:p>
+            <a:pPr algn="ctr"/>
+            <a:r>
+              <a:rPr lang="en-US" sz="1600" dirty="0" smtClean="0">
+                <a:solidFill>
+                  <a:schemeClr val="tx1"/>
+                </a:solidFill>
+              </a:rPr>
+              <a:t>Task8a</a:t>
+            </a:r>
+            <a:endParaRPr lang="en-US" sz="1600" dirty="0">
+              <a:solidFill>
+                <a:schemeClr val="tx1"/>
+              </a:solidFill>
+            </a:endParaRPr>
+          </a:p>
+        </p:txBody>
+      </p:sp>
+      <p:sp>
+        <p:nvSpPr>
+          <p:cNvPr id="30" name="Oval 29"/>
+          <p:cNvSpPr/>
+          <p:nvPr/>
+        </p:nvSpPr>
+        <p:spPr>
+          <a:xfrm>
+            <a:off x="8133397" y="3135630"/>
+            <a:ext cx="901065" cy="706120"/>
+          </a:xfrm>
+          <a:prstGeom prst="ellipse">
+            <a:avLst/>
+          </a:prstGeom>
+        </p:spPr>
+        <p:style>
+          <a:lnRef idx="2">
+            <a:schemeClr val="accent1">
+              <a:shade val="50000"/>
+            </a:schemeClr>
+          </a:lnRef>
+          <a:fillRef idx="1">
+            <a:schemeClr val="accent1"/>
+          </a:fillRef>
+          <a:effectRef idx="0">
+            <a:schemeClr val="accent1"/>
+          </a:effectRef>
+          <a:fontRef idx="minor">
+            <a:schemeClr val="lt1"/>
+          </a:fontRef>
+        </p:style>
+        <p:txBody>
+          <a:bodyPr rtlCol="0" anchor="ctr"/>
+          <a:lstStyle/>
+          <a:p>
+            <a:pPr algn="ctr"/>
+            <a:r>
+              <a:rPr lang="en-US" sz="1600" dirty="0" smtClean="0">
+                <a:solidFill>
+                  <a:schemeClr val="tx1"/>
+                </a:solidFill>
+              </a:rPr>
+              <a:t>Task9a</a:t>
+            </a:r>
+            <a:endParaRPr lang="en-US" sz="1600" dirty="0">
+              <a:solidFill>
+                <a:schemeClr val="tx1"/>
+              </a:solidFill>
+            </a:endParaRPr>
+          </a:p>
+        </p:txBody>
+      </p:sp>
+      <p:sp>
+        <p:nvSpPr>
+          <p:cNvPr id="31" name="Oval 30"/>
+          <p:cNvSpPr/>
+          <p:nvPr/>
+        </p:nvSpPr>
+        <p:spPr>
+          <a:xfrm>
+            <a:off x="2040967" y="3580130"/>
+            <a:ext cx="901065" cy="706120"/>
+          </a:xfrm>
+          <a:prstGeom prst="ellipse">
+            <a:avLst/>
+          </a:prstGeom>
+        </p:spPr>
+        <p:style>
+          <a:lnRef idx="2">
+            <a:schemeClr val="accent1">
+              <a:shade val="50000"/>
+            </a:schemeClr>
+          </a:lnRef>
+          <a:fillRef idx="1">
+            <a:schemeClr val="accent1"/>
+          </a:fillRef>
+          <a:effectRef idx="0">
+            <a:schemeClr val="accent1"/>
+          </a:effectRef>
+          <a:fontRef idx="minor">
+            <a:schemeClr val="lt1"/>
+          </a:fontRef>
+        </p:style>
+        <p:txBody>
+          <a:bodyPr rtlCol="0" anchor="ctr"/>
+          <a:lstStyle/>
+          <a:p>
+            <a:pPr algn="ctr"/>
+            <a:r>
+              <a:rPr lang="en-US" sz="1600" dirty="0" smtClean="0">
+                <a:solidFill>
+                  <a:schemeClr val="tx1"/>
+                </a:solidFill>
+              </a:rPr>
+              <a:t>Task3b</a:t>
+            </a:r>
+            <a:endParaRPr lang="en-US" sz="1600" dirty="0">
+              <a:solidFill>
+                <a:schemeClr val="tx1"/>
+              </a:solidFill>
+            </a:endParaRPr>
+          </a:p>
+        </p:txBody>
+      </p:sp>
+      <p:sp>
+        <p:nvSpPr>
+          <p:cNvPr id="32" name="Oval 31"/>
+          <p:cNvSpPr/>
+          <p:nvPr/>
+        </p:nvSpPr>
+        <p:spPr>
+          <a:xfrm>
+            <a:off x="3047365" y="3580130"/>
+            <a:ext cx="901065" cy="706120"/>
+          </a:xfrm>
+          <a:prstGeom prst="ellipse">
+            <a:avLst/>
+          </a:prstGeom>
+        </p:spPr>
+        <p:style>
+          <a:lnRef idx="2">
+            <a:schemeClr val="accent1">
+              <a:shade val="50000"/>
+            </a:schemeClr>
+          </a:lnRef>
+          <a:fillRef idx="1">
+            <a:schemeClr val="accent1"/>
+          </a:fillRef>
+          <a:effectRef idx="0">
+            <a:schemeClr val="accent1"/>
+          </a:effectRef>
+          <a:fontRef idx="minor">
+            <a:schemeClr val="lt1"/>
+          </a:fontRef>
+        </p:style>
+        <p:txBody>
+          <a:bodyPr rtlCol="0" anchor="ctr"/>
+          <a:lstStyle/>
+          <a:p>
+            <a:pPr algn="ctr"/>
+            <a:r>
+              <a:rPr lang="en-US" sz="1600" dirty="0" smtClean="0">
+                <a:solidFill>
+                  <a:schemeClr val="tx1"/>
+                </a:solidFill>
+              </a:rPr>
+              <a:t>Task4</a:t>
+            </a:r>
+            <a:endParaRPr lang="en-US" sz="1600" dirty="0">
+              <a:solidFill>
+                <a:schemeClr val="tx1"/>
+              </a:solidFill>
+            </a:endParaRPr>
+          </a:p>
+        </p:txBody>
+      </p:sp>
+      <p:sp>
+        <p:nvSpPr>
+          <p:cNvPr id="33" name="Oval 32"/>
+          <p:cNvSpPr/>
+          <p:nvPr/>
+        </p:nvSpPr>
+        <p:spPr>
+          <a:xfrm>
+            <a:off x="4025899" y="4144010"/>
+            <a:ext cx="901065" cy="706120"/>
+          </a:xfrm>
+          <a:prstGeom prst="ellipse">
+            <a:avLst/>
+          </a:prstGeom>
+        </p:spPr>
+        <p:style>
+          <a:lnRef idx="2">
+            <a:schemeClr val="accent1">
+              <a:shade val="50000"/>
+            </a:schemeClr>
+          </a:lnRef>
+          <a:fillRef idx="1">
+            <a:schemeClr val="accent1"/>
+          </a:fillRef>
+          <a:effectRef idx="0">
+            <a:schemeClr val="accent1"/>
+          </a:effectRef>
+          <a:fontRef idx="minor">
+            <a:schemeClr val="lt1"/>
+          </a:fontRef>
+        </p:style>
+        <p:txBody>
+          <a:bodyPr rtlCol="0" anchor="ctr"/>
+          <a:lstStyle/>
+          <a:p>
+            <a:pPr algn="ctr"/>
+            <a:r>
+              <a:rPr lang="en-US" sz="1600" dirty="0" smtClean="0">
+                <a:solidFill>
+                  <a:schemeClr val="tx1"/>
+                </a:solidFill>
+              </a:rPr>
+              <a:t>Task5b</a:t>
+            </a:r>
+            <a:endParaRPr lang="en-US" sz="1600" dirty="0">
+              <a:solidFill>
+                <a:schemeClr val="tx1"/>
+              </a:solidFill>
+            </a:endParaRPr>
+          </a:p>
+        </p:txBody>
+      </p:sp>
+      <p:sp>
+        <p:nvSpPr>
+          <p:cNvPr id="34" name="Oval 33"/>
+          <p:cNvSpPr/>
+          <p:nvPr/>
+        </p:nvSpPr>
+        <p:spPr>
+          <a:xfrm>
+            <a:off x="5051266" y="3580130"/>
+            <a:ext cx="901065" cy="706120"/>
+          </a:xfrm>
+          <a:prstGeom prst="ellipse">
+            <a:avLst/>
+          </a:prstGeom>
+        </p:spPr>
+        <p:style>
+          <a:lnRef idx="2">
+            <a:schemeClr val="accent1">
+              <a:shade val="50000"/>
+            </a:schemeClr>
+          </a:lnRef>
+          <a:fillRef idx="1">
+            <a:schemeClr val="accent1"/>
+          </a:fillRef>
+          <a:effectRef idx="0">
+            <a:schemeClr val="accent1"/>
+          </a:effectRef>
+          <a:fontRef idx="minor">
+            <a:schemeClr val="lt1"/>
+          </a:fontRef>
+        </p:style>
+        <p:txBody>
+          <a:bodyPr rtlCol="0" anchor="ctr"/>
+          <a:lstStyle/>
+          <a:p>
+            <a:pPr algn="ctr"/>
+            <a:r>
+              <a:rPr lang="en-US" sz="1600" dirty="0" smtClean="0">
+                <a:solidFill>
+                  <a:schemeClr val="tx1"/>
+                </a:solidFill>
+              </a:rPr>
+              <a:t>Task6b</a:t>
+            </a:r>
+            <a:endParaRPr lang="en-US" sz="1600" dirty="0">
+              <a:solidFill>
+                <a:schemeClr val="tx1"/>
+              </a:solidFill>
+            </a:endParaRPr>
+          </a:p>
+        </p:txBody>
+      </p:sp>
+      <p:sp>
+        <p:nvSpPr>
+          <p:cNvPr id="35" name="Oval 34"/>
+          <p:cNvSpPr/>
+          <p:nvPr/>
+        </p:nvSpPr>
+        <p:spPr>
+          <a:xfrm>
+            <a:off x="6054566" y="3580130"/>
+            <a:ext cx="901065" cy="706120"/>
+          </a:xfrm>
+          <a:prstGeom prst="ellipse">
+            <a:avLst/>
+          </a:prstGeom>
+        </p:spPr>
+        <p:style>
+          <a:lnRef idx="2">
+            <a:schemeClr val="accent1">
+              <a:shade val="50000"/>
+            </a:schemeClr>
+          </a:lnRef>
+          <a:fillRef idx="1">
+            <a:schemeClr val="accent1"/>
+          </a:fillRef>
+          <a:effectRef idx="0">
+            <a:schemeClr val="accent1"/>
+          </a:effectRef>
+          <a:fontRef idx="minor">
+            <a:schemeClr val="lt1"/>
+          </a:fontRef>
+        </p:style>
+        <p:txBody>
+          <a:bodyPr rtlCol="0" anchor="ctr"/>
+          <a:lstStyle/>
+          <a:p>
+            <a:pPr algn="ctr"/>
+            <a:r>
+              <a:rPr lang="en-US" sz="1600" dirty="0" smtClean="0">
+                <a:solidFill>
+                  <a:schemeClr val="tx1"/>
+                </a:solidFill>
+              </a:rPr>
+              <a:t>Task7</a:t>
+            </a:r>
+            <a:endParaRPr lang="en-US" sz="1600" dirty="0">
+              <a:solidFill>
+                <a:schemeClr val="tx1"/>
+              </a:solidFill>
+            </a:endParaRPr>
+          </a:p>
+        </p:txBody>
+      </p:sp>
+      <p:sp>
+        <p:nvSpPr>
+          <p:cNvPr id="36" name="Oval 35"/>
+          <p:cNvSpPr/>
+          <p:nvPr/>
+        </p:nvSpPr>
+        <p:spPr>
+          <a:xfrm>
+            <a:off x="7046788" y="4144010"/>
+            <a:ext cx="901065" cy="706120"/>
+          </a:xfrm>
+          <a:prstGeom prst="ellipse">
+            <a:avLst/>
+          </a:prstGeom>
+        </p:spPr>
+        <p:style>
+          <a:lnRef idx="2">
+            <a:schemeClr val="accent1">
+              <a:shade val="50000"/>
+            </a:schemeClr>
+          </a:lnRef>
+          <a:fillRef idx="1">
+            <a:schemeClr val="accent1"/>
+          </a:fillRef>
+          <a:effectRef idx="0">
+            <a:schemeClr val="accent1"/>
+          </a:effectRef>
+          <a:fontRef idx="minor">
+            <a:schemeClr val="lt1"/>
+          </a:fontRef>
+        </p:style>
+        <p:txBody>
+          <a:bodyPr rtlCol="0" anchor="ctr"/>
+          <a:lstStyle/>
+          <a:p>
+            <a:pPr algn="ctr"/>
+            <a:r>
+              <a:rPr lang="en-US" sz="1600" dirty="0" smtClean="0">
+                <a:solidFill>
+                  <a:schemeClr val="tx1"/>
+                </a:solidFill>
+              </a:rPr>
+              <a:t>Task8b</a:t>
+            </a:r>
+            <a:endParaRPr lang="en-US" sz="1600" dirty="0">
+              <a:solidFill>
+                <a:schemeClr val="tx1"/>
+              </a:solidFill>
+            </a:endParaRPr>
+          </a:p>
+        </p:txBody>
+      </p:sp>
+      <p:sp>
+        <p:nvSpPr>
+          <p:cNvPr id="37" name="Oval 36"/>
+          <p:cNvSpPr/>
+          <p:nvPr/>
+        </p:nvSpPr>
+        <p:spPr>
+          <a:xfrm>
+            <a:off x="8111330" y="4144010"/>
+            <a:ext cx="901065" cy="706120"/>
+          </a:xfrm>
+          <a:prstGeom prst="ellipse">
+            <a:avLst/>
+          </a:prstGeom>
+        </p:spPr>
+        <p:style>
+          <a:lnRef idx="2">
+            <a:schemeClr val="accent1">
+              <a:shade val="50000"/>
+            </a:schemeClr>
+          </a:lnRef>
+          <a:fillRef idx="1">
+            <a:schemeClr val="accent1"/>
+          </a:fillRef>
+          <a:effectRef idx="0">
+            <a:schemeClr val="accent1"/>
+          </a:effectRef>
+          <a:fontRef idx="minor">
+            <a:schemeClr val="lt1"/>
+          </a:fontRef>
+        </p:style>
+        <p:txBody>
+          <a:bodyPr rtlCol="0" anchor="ctr"/>
+          <a:lstStyle/>
+          <a:p>
+            <a:pPr algn="ctr"/>
+            <a:r>
+              <a:rPr lang="en-US" sz="1600" dirty="0" smtClean="0">
+                <a:solidFill>
+                  <a:schemeClr val="tx1"/>
+                </a:solidFill>
+              </a:rPr>
+              <a:t>Task9b</a:t>
+            </a:r>
+            <a:endParaRPr lang="en-US" sz="1600" dirty="0">
+              <a:solidFill>
+                <a:schemeClr val="tx1"/>
+              </a:solidFill>
+            </a:endParaRPr>
+          </a:p>
+        </p:txBody>
+      </p:sp>
+      <p:sp>
+        <p:nvSpPr>
+          <p:cNvPr id="38" name="Oval 37"/>
+          <p:cNvSpPr/>
+          <p:nvPr/>
+        </p:nvSpPr>
+        <p:spPr>
+          <a:xfrm>
+            <a:off x="11105197" y="3580130"/>
+            <a:ext cx="901065" cy="706120"/>
+          </a:xfrm>
+          <a:prstGeom prst="ellipse">
+            <a:avLst/>
+          </a:prstGeom>
+        </p:spPr>
+        <p:style>
+          <a:lnRef idx="2">
+            <a:schemeClr val="accent1">
+              <a:shade val="50000"/>
+            </a:schemeClr>
+          </a:lnRef>
+          <a:fillRef idx="1">
+            <a:schemeClr val="accent1"/>
+          </a:fillRef>
+          <a:effectRef idx="0">
+            <a:schemeClr val="accent1"/>
+          </a:effectRef>
+          <a:fontRef idx="minor">
+            <a:schemeClr val="lt1"/>
+          </a:fontRef>
+        </p:style>
+        <p:txBody>
+          <a:bodyPr rtlCol="0" anchor="ctr"/>
+          <a:lstStyle/>
+          <a:p>
+            <a:pPr algn="ctr"/>
+            <a:r>
+              <a:rPr lang="en-US" sz="1600" dirty="0" smtClean="0">
+                <a:solidFill>
+                  <a:schemeClr val="tx1"/>
+                </a:solidFill>
+              </a:rPr>
+              <a:t>Task12</a:t>
+            </a:r>
+            <a:endParaRPr lang="en-US" sz="1600" dirty="0">
+              <a:solidFill>
+                <a:schemeClr val="tx1"/>
+              </a:solidFill>
+            </a:endParaRPr>
+          </a:p>
+        </p:txBody>
+      </p:sp>
+      <p:sp>
+        <p:nvSpPr>
+          <p:cNvPr id="39" name="Oval 38"/>
+          <p:cNvSpPr/>
+          <p:nvPr/>
+        </p:nvSpPr>
+        <p:spPr>
+          <a:xfrm>
+            <a:off x="9139590" y="3580130"/>
+            <a:ext cx="901065" cy="706120"/>
+          </a:xfrm>
+          <a:prstGeom prst="ellipse">
+            <a:avLst/>
+          </a:prstGeom>
+        </p:spPr>
+        <p:style>
+          <a:lnRef idx="2">
+            <a:schemeClr val="accent1">
+              <a:shade val="50000"/>
+            </a:schemeClr>
+          </a:lnRef>
+          <a:fillRef idx="1">
+            <a:schemeClr val="accent1"/>
+          </a:fillRef>
+          <a:effectRef idx="0">
+            <a:schemeClr val="accent1"/>
+          </a:effectRef>
+          <a:fontRef idx="minor">
+            <a:schemeClr val="lt1"/>
+          </a:fontRef>
+        </p:style>
+        <p:txBody>
+          <a:bodyPr rtlCol="0" anchor="ctr"/>
+          <a:lstStyle/>
+          <a:p>
+            <a:pPr algn="ctr"/>
+            <a:r>
+              <a:rPr lang="en-US" sz="1600" dirty="0" smtClean="0">
+                <a:solidFill>
+                  <a:schemeClr val="tx1"/>
+                </a:solidFill>
+              </a:rPr>
+              <a:t>Task10</a:t>
+            </a:r>
+            <a:endParaRPr lang="en-US" sz="1600" dirty="0">
+              <a:solidFill>
+                <a:schemeClr val="tx1"/>
+              </a:solidFill>
+            </a:endParaRPr>
+          </a:p>
+        </p:txBody>
+      </p:sp>
+      <p:sp>
+        <p:nvSpPr>
+          <p:cNvPr id="40" name="Oval 39"/>
+          <p:cNvSpPr/>
+          <p:nvPr/>
+        </p:nvSpPr>
+        <p:spPr>
+          <a:xfrm>
+            <a:off x="10085863" y="3135630"/>
+            <a:ext cx="901065" cy="706120"/>
+          </a:xfrm>
+          <a:prstGeom prst="ellipse">
+            <a:avLst/>
+          </a:prstGeom>
+        </p:spPr>
+        <p:style>
+          <a:lnRef idx="2">
+            <a:schemeClr val="accent1">
+              <a:shade val="50000"/>
+            </a:schemeClr>
+          </a:lnRef>
+          <a:fillRef idx="1">
+            <a:schemeClr val="accent1"/>
+          </a:fillRef>
+          <a:effectRef idx="0">
+            <a:schemeClr val="accent1"/>
+          </a:effectRef>
+          <a:fontRef idx="minor">
+            <a:schemeClr val="lt1"/>
+          </a:fontRef>
+        </p:style>
+        <p:txBody>
+          <a:bodyPr rtlCol="0" anchor="ctr"/>
+          <a:lstStyle/>
+          <a:p>
+            <a:pPr algn="ctr"/>
+            <a:r>
+              <a:rPr lang="en-US" sz="1600" dirty="0" smtClean="0">
+                <a:solidFill>
+                  <a:schemeClr val="tx1"/>
+                </a:solidFill>
+              </a:rPr>
+              <a:t>Task11a</a:t>
+            </a:r>
+            <a:endParaRPr lang="en-US" sz="1600" dirty="0">
+              <a:solidFill>
+                <a:schemeClr val="tx1"/>
+              </a:solidFill>
+            </a:endParaRPr>
+          </a:p>
+        </p:txBody>
+      </p:sp>
+      <p:sp>
+        <p:nvSpPr>
+          <p:cNvPr id="41" name="Oval 40"/>
+          <p:cNvSpPr/>
+          <p:nvPr/>
+        </p:nvSpPr>
+        <p:spPr>
+          <a:xfrm>
+            <a:off x="10085864" y="4076700"/>
+            <a:ext cx="901065" cy="706120"/>
+          </a:xfrm>
+          <a:prstGeom prst="ellipse">
+            <a:avLst/>
+          </a:prstGeom>
+        </p:spPr>
+        <p:style>
+          <a:lnRef idx="2">
+            <a:schemeClr val="accent1">
+              <a:shade val="50000"/>
+            </a:schemeClr>
+          </a:lnRef>
+          <a:fillRef idx="1">
+            <a:schemeClr val="accent1"/>
+          </a:fillRef>
+          <a:effectRef idx="0">
+            <a:schemeClr val="accent1"/>
+          </a:effectRef>
+          <a:fontRef idx="minor">
+            <a:schemeClr val="lt1"/>
+          </a:fontRef>
+        </p:style>
+        <p:txBody>
+          <a:bodyPr rtlCol="0" anchor="ctr"/>
+          <a:lstStyle/>
+          <a:p>
+            <a:pPr algn="ctr"/>
+            <a:r>
+              <a:rPr lang="en-US" sz="1600" dirty="0" smtClean="0">
+                <a:solidFill>
+                  <a:schemeClr val="tx1"/>
+                </a:solidFill>
+              </a:rPr>
+              <a:t>Task11b</a:t>
+            </a:r>
+            <a:endParaRPr lang="en-US" sz="1600" dirty="0">
+              <a:solidFill>
+                <a:schemeClr val="tx1"/>
+              </a:solidFill>
+            </a:endParaRPr>
+          </a:p>
+        </p:txBody>
+      </p:sp>
+      <p:cxnSp>
+        <p:nvCxnSpPr>
+          <p:cNvPr id="48" name="Straight Arrow Connector 47"/>
+          <p:cNvCxnSpPr>
+            <a:stCxn id="17" idx="6"/>
+            <a:endCxn id="23" idx="2"/>
+          </p:cNvCxnSpPr>
+          <p:nvPr/>
+        </p:nvCxnSpPr>
+        <p:spPr>
+          <a:xfrm>
+            <a:off x="901065" y="3933190"/>
+            <a:ext cx="100569" cy="0"/>
+          </a:xfrm>
+          <a:prstGeom prst="straightConnector1">
+            <a:avLst/>
+          </a:prstGeom>
+          <a:ln>
+            <a:tailEnd type="triangle"/>
+          </a:ln>
+        </p:spPr>
+        <p:style>
+          <a:lnRef idx="1">
+            <a:schemeClr val="dk1"/>
+          </a:lnRef>
+          <a:fillRef idx="0">
+            <a:schemeClr val="dk1"/>
+          </a:fillRef>
+          <a:effectRef idx="0">
+            <a:schemeClr val="dk1"/>
+          </a:effectRef>
+          <a:fontRef idx="minor">
+            <a:schemeClr val="tx1"/>
+          </a:fontRef>
+        </p:style>
+      </p:cxnSp>
+      <p:cxnSp>
+        <p:nvCxnSpPr>
+          <p:cNvPr id="50" name="Straight Arrow Connector 49"/>
+          <p:cNvCxnSpPr>
+            <a:stCxn id="23" idx="7"/>
+            <a:endCxn id="25" idx="3"/>
+          </p:cNvCxnSpPr>
+          <p:nvPr/>
+        </p:nvCxnSpPr>
+        <p:spPr>
+          <a:xfrm flipV="1">
+            <a:off x="1770741" y="3390996"/>
+            <a:ext cx="402185" cy="292543"/>
+          </a:xfrm>
+          <a:prstGeom prst="straightConnector1">
+            <a:avLst/>
+          </a:prstGeom>
+          <a:ln>
+            <a:tailEnd type="triangle"/>
+          </a:ln>
+        </p:spPr>
+        <p:style>
+          <a:lnRef idx="1">
+            <a:schemeClr val="dk1"/>
+          </a:lnRef>
+          <a:fillRef idx="0">
+            <a:schemeClr val="dk1"/>
+          </a:fillRef>
+          <a:effectRef idx="0">
+            <a:schemeClr val="dk1"/>
+          </a:effectRef>
+          <a:fontRef idx="minor">
+            <a:schemeClr val="tx1"/>
+          </a:fontRef>
+        </p:style>
+      </p:cxnSp>
+      <p:cxnSp>
+        <p:nvCxnSpPr>
+          <p:cNvPr id="52" name="Straight Arrow Connector 51"/>
+          <p:cNvCxnSpPr>
+            <a:stCxn id="23" idx="6"/>
+            <a:endCxn id="31" idx="2"/>
+          </p:cNvCxnSpPr>
+          <p:nvPr/>
+        </p:nvCxnSpPr>
+        <p:spPr>
+          <a:xfrm>
+            <a:off x="1902699" y="3933190"/>
+            <a:ext cx="138268" cy="0"/>
+          </a:xfrm>
+          <a:prstGeom prst="straightConnector1">
+            <a:avLst/>
+          </a:prstGeom>
+          <a:ln>
+            <a:tailEnd type="triangle"/>
+          </a:ln>
+        </p:spPr>
+        <p:style>
+          <a:lnRef idx="1">
+            <a:schemeClr val="dk1"/>
+          </a:lnRef>
+          <a:fillRef idx="0">
+            <a:schemeClr val="dk1"/>
+          </a:fillRef>
+          <a:effectRef idx="0">
+            <a:schemeClr val="dk1"/>
+          </a:effectRef>
+          <a:fontRef idx="minor">
+            <a:schemeClr val="tx1"/>
+          </a:fontRef>
+        </p:style>
+      </p:cxnSp>
+      <p:cxnSp>
+        <p:nvCxnSpPr>
+          <p:cNvPr id="54" name="Straight Arrow Connector 53"/>
+          <p:cNvCxnSpPr>
+            <a:stCxn id="23" idx="5"/>
+            <a:endCxn id="24" idx="1"/>
+          </p:cNvCxnSpPr>
+          <p:nvPr/>
+        </p:nvCxnSpPr>
+        <p:spPr>
+          <a:xfrm>
+            <a:off x="1770741" y="4182841"/>
+            <a:ext cx="402184" cy="359218"/>
+          </a:xfrm>
+          <a:prstGeom prst="straightConnector1">
+            <a:avLst/>
+          </a:prstGeom>
+          <a:ln>
+            <a:tailEnd type="triangle"/>
+          </a:ln>
+        </p:spPr>
+        <p:style>
+          <a:lnRef idx="1">
+            <a:schemeClr val="dk1"/>
+          </a:lnRef>
+          <a:fillRef idx="0">
+            <a:schemeClr val="dk1"/>
+          </a:fillRef>
+          <a:effectRef idx="0">
+            <a:schemeClr val="dk1"/>
+          </a:effectRef>
+          <a:fontRef idx="minor">
+            <a:schemeClr val="tx1"/>
+          </a:fontRef>
+        </p:style>
+      </p:cxnSp>
+      <p:cxnSp>
+        <p:nvCxnSpPr>
+          <p:cNvPr id="61" name="Straight Arrow Connector 60"/>
+          <p:cNvCxnSpPr>
+            <a:stCxn id="31" idx="6"/>
+            <a:endCxn id="32" idx="2"/>
+          </p:cNvCxnSpPr>
+          <p:nvPr/>
+        </p:nvCxnSpPr>
+        <p:spPr>
+          <a:xfrm>
+            <a:off x="2942032" y="3933190"/>
+            <a:ext cx="105333" cy="0"/>
+          </a:xfrm>
+          <a:prstGeom prst="straightConnector1">
+            <a:avLst/>
+          </a:prstGeom>
+          <a:ln>
+            <a:tailEnd type="triangle"/>
+          </a:ln>
+        </p:spPr>
+        <p:style>
+          <a:lnRef idx="1">
+            <a:schemeClr val="dk1"/>
+          </a:lnRef>
+          <a:fillRef idx="0">
+            <a:schemeClr val="dk1"/>
+          </a:fillRef>
+          <a:effectRef idx="0">
+            <a:schemeClr val="dk1"/>
+          </a:effectRef>
+          <a:fontRef idx="minor">
+            <a:schemeClr val="tx1"/>
+          </a:fontRef>
+        </p:style>
+      </p:cxnSp>
+      <p:cxnSp>
+        <p:nvCxnSpPr>
+          <p:cNvPr id="64" name="Straight Arrow Connector 63"/>
+          <p:cNvCxnSpPr>
+            <a:stCxn id="25" idx="5"/>
+            <a:endCxn id="32" idx="1"/>
+          </p:cNvCxnSpPr>
+          <p:nvPr/>
+        </p:nvCxnSpPr>
+        <p:spPr>
+          <a:xfrm>
+            <a:off x="2810075" y="3390996"/>
+            <a:ext cx="369248" cy="292543"/>
+          </a:xfrm>
+          <a:prstGeom prst="straightConnector1">
+            <a:avLst/>
+          </a:prstGeom>
+          <a:ln>
+            <a:tailEnd type="triangle"/>
+          </a:ln>
+        </p:spPr>
+        <p:style>
+          <a:lnRef idx="1">
+            <a:schemeClr val="dk1"/>
+          </a:lnRef>
+          <a:fillRef idx="0">
+            <a:schemeClr val="dk1"/>
+          </a:fillRef>
+          <a:effectRef idx="0">
+            <a:schemeClr val="dk1"/>
+          </a:effectRef>
+          <a:fontRef idx="minor">
+            <a:schemeClr val="tx1"/>
+          </a:fontRef>
+        </p:style>
+      </p:cxnSp>
+      <p:cxnSp>
+        <p:nvCxnSpPr>
+          <p:cNvPr id="66" name="Straight Arrow Connector 65"/>
+          <p:cNvCxnSpPr>
+            <a:stCxn id="24" idx="7"/>
+            <a:endCxn id="32" idx="3"/>
+          </p:cNvCxnSpPr>
+          <p:nvPr/>
+        </p:nvCxnSpPr>
+        <p:spPr>
+          <a:xfrm flipV="1">
+            <a:off x="2810074" y="4182841"/>
+            <a:ext cx="369249" cy="359218"/>
+          </a:xfrm>
+          <a:prstGeom prst="straightConnector1">
+            <a:avLst/>
+          </a:prstGeom>
+          <a:ln>
+            <a:tailEnd type="triangle"/>
+          </a:ln>
+        </p:spPr>
+        <p:style>
+          <a:lnRef idx="1">
+            <a:schemeClr val="dk1"/>
+          </a:lnRef>
+          <a:fillRef idx="0">
+            <a:schemeClr val="dk1"/>
+          </a:fillRef>
+          <a:effectRef idx="0">
+            <a:schemeClr val="dk1"/>
+          </a:effectRef>
+          <a:fontRef idx="minor">
+            <a:schemeClr val="tx1"/>
+          </a:fontRef>
+        </p:style>
+      </p:cxnSp>
+      <p:cxnSp>
+        <p:nvCxnSpPr>
+          <p:cNvPr id="68" name="Straight Arrow Connector 67"/>
+          <p:cNvCxnSpPr>
+            <a:stCxn id="32" idx="7"/>
+            <a:endCxn id="26" idx="2"/>
+          </p:cNvCxnSpPr>
+          <p:nvPr/>
+        </p:nvCxnSpPr>
+        <p:spPr>
+          <a:xfrm flipV="1">
+            <a:off x="3816472" y="3488690"/>
+            <a:ext cx="209427" cy="194849"/>
+          </a:xfrm>
+          <a:prstGeom prst="straightConnector1">
+            <a:avLst/>
+          </a:prstGeom>
+          <a:ln>
+            <a:tailEnd type="triangle"/>
+          </a:ln>
+        </p:spPr>
+        <p:style>
+          <a:lnRef idx="1">
+            <a:schemeClr val="dk1"/>
+          </a:lnRef>
+          <a:fillRef idx="0">
+            <a:schemeClr val="dk1"/>
+          </a:fillRef>
+          <a:effectRef idx="0">
+            <a:schemeClr val="dk1"/>
+          </a:effectRef>
+          <a:fontRef idx="minor">
+            <a:schemeClr val="tx1"/>
+          </a:fontRef>
+        </p:style>
+      </p:cxnSp>
+      <p:cxnSp>
+        <p:nvCxnSpPr>
+          <p:cNvPr id="70" name="Straight Arrow Connector 69"/>
+          <p:cNvCxnSpPr>
+            <a:stCxn id="32" idx="5"/>
+            <a:endCxn id="33" idx="2"/>
+          </p:cNvCxnSpPr>
+          <p:nvPr/>
+        </p:nvCxnSpPr>
+        <p:spPr>
+          <a:xfrm>
+            <a:off x="3816472" y="4182841"/>
+            <a:ext cx="209427" cy="314229"/>
+          </a:xfrm>
+          <a:prstGeom prst="straightConnector1">
+            <a:avLst/>
+          </a:prstGeom>
+          <a:ln>
+            <a:tailEnd type="triangle"/>
+          </a:ln>
+        </p:spPr>
+        <p:style>
+          <a:lnRef idx="1">
+            <a:schemeClr val="dk1"/>
+          </a:lnRef>
+          <a:fillRef idx="0">
+            <a:schemeClr val="dk1"/>
+          </a:fillRef>
+          <a:effectRef idx="0">
+            <a:schemeClr val="dk1"/>
+          </a:effectRef>
+          <a:fontRef idx="minor">
+            <a:schemeClr val="tx1"/>
+          </a:fontRef>
+        </p:style>
+      </p:cxnSp>
+      <p:cxnSp>
+        <p:nvCxnSpPr>
+          <p:cNvPr id="73" name="Straight Arrow Connector 72"/>
+          <p:cNvCxnSpPr>
+            <a:stCxn id="26" idx="5"/>
+          </p:cNvCxnSpPr>
+          <p:nvPr/>
+        </p:nvCxnSpPr>
+        <p:spPr>
+          <a:xfrm>
+            <a:off x="4795006" y="3738341"/>
+            <a:ext cx="148580" cy="202834"/>
+          </a:xfrm>
+          <a:prstGeom prst="straightConnector1">
+            <a:avLst/>
+          </a:prstGeom>
+          <a:ln>
+            <a:tailEnd type="triangle"/>
+          </a:ln>
+        </p:spPr>
+        <p:style>
+          <a:lnRef idx="1">
+            <a:schemeClr val="dk1"/>
+          </a:lnRef>
+          <a:fillRef idx="0">
+            <a:schemeClr val="dk1"/>
+          </a:fillRef>
+          <a:effectRef idx="0">
+            <a:schemeClr val="dk1"/>
+          </a:effectRef>
+          <a:fontRef idx="minor">
+            <a:schemeClr val="tx1"/>
+          </a:fontRef>
+        </p:style>
+      </p:cxnSp>
+      <p:cxnSp>
+        <p:nvCxnSpPr>
+          <p:cNvPr id="75" name="Straight Arrow Connector 74"/>
+          <p:cNvCxnSpPr>
+            <a:stCxn id="33" idx="7"/>
+          </p:cNvCxnSpPr>
+          <p:nvPr/>
+        </p:nvCxnSpPr>
+        <p:spPr>
+          <a:xfrm flipV="1">
+            <a:off x="4795006" y="3941175"/>
+            <a:ext cx="154024" cy="306244"/>
+          </a:xfrm>
+          <a:prstGeom prst="straightConnector1">
+            <a:avLst/>
+          </a:prstGeom>
+          <a:ln>
+            <a:tailEnd type="triangle"/>
+          </a:ln>
+        </p:spPr>
+        <p:style>
+          <a:lnRef idx="1">
+            <a:schemeClr val="dk1"/>
+          </a:lnRef>
+          <a:fillRef idx="0">
+            <a:schemeClr val="dk1"/>
+          </a:fillRef>
+          <a:effectRef idx="0">
+            <a:schemeClr val="dk1"/>
+          </a:effectRef>
+          <a:fontRef idx="minor">
+            <a:schemeClr val="tx1"/>
+          </a:fontRef>
+        </p:style>
+      </p:cxnSp>
+      <p:cxnSp>
+        <p:nvCxnSpPr>
+          <p:cNvPr id="77" name="Straight Arrow Connector 76"/>
+          <p:cNvCxnSpPr>
+            <a:endCxn id="28" idx="3"/>
+          </p:cNvCxnSpPr>
+          <p:nvPr/>
+        </p:nvCxnSpPr>
+        <p:spPr>
+          <a:xfrm flipV="1">
+            <a:off x="4971098" y="3390996"/>
+            <a:ext cx="250226" cy="542194"/>
+          </a:xfrm>
+          <a:prstGeom prst="straightConnector1">
+            <a:avLst/>
+          </a:prstGeom>
+          <a:ln>
+            <a:tailEnd type="triangle"/>
+          </a:ln>
+        </p:spPr>
+        <p:style>
+          <a:lnRef idx="1">
+            <a:schemeClr val="dk1"/>
+          </a:lnRef>
+          <a:fillRef idx="0">
+            <a:schemeClr val="dk1"/>
+          </a:fillRef>
+          <a:effectRef idx="0">
+            <a:schemeClr val="dk1"/>
+          </a:effectRef>
+          <a:fontRef idx="minor">
+            <a:schemeClr val="tx1"/>
+          </a:fontRef>
+        </p:style>
+      </p:cxnSp>
+      <p:cxnSp>
+        <p:nvCxnSpPr>
+          <p:cNvPr id="88" name="Straight Arrow Connector 87"/>
+          <p:cNvCxnSpPr>
+            <a:endCxn id="27" idx="1"/>
+          </p:cNvCxnSpPr>
+          <p:nvPr/>
+        </p:nvCxnSpPr>
+        <p:spPr>
+          <a:xfrm>
+            <a:off x="4971098" y="3941175"/>
+            <a:ext cx="218159" cy="600884"/>
+          </a:xfrm>
+          <a:prstGeom prst="straightConnector1">
+            <a:avLst/>
+          </a:prstGeom>
+          <a:ln>
+            <a:tailEnd type="triangle"/>
+          </a:ln>
+        </p:spPr>
+        <p:style>
+          <a:lnRef idx="1">
+            <a:schemeClr val="dk1"/>
+          </a:lnRef>
+          <a:fillRef idx="0">
+            <a:schemeClr val="dk1"/>
+          </a:fillRef>
+          <a:effectRef idx="0">
+            <a:schemeClr val="dk1"/>
+          </a:effectRef>
+          <a:fontRef idx="minor">
+            <a:schemeClr val="tx1"/>
+          </a:fontRef>
+        </p:style>
+      </p:cxnSp>
+      <p:cxnSp>
+        <p:nvCxnSpPr>
+          <p:cNvPr id="90" name="Straight Arrow Connector 89"/>
+          <p:cNvCxnSpPr>
+            <a:endCxn id="34" idx="2"/>
+          </p:cNvCxnSpPr>
+          <p:nvPr/>
+        </p:nvCxnSpPr>
+        <p:spPr>
+          <a:xfrm flipV="1">
+            <a:off x="4943586" y="3933190"/>
+            <a:ext cx="107680" cy="7985"/>
+          </a:xfrm>
+          <a:prstGeom prst="straightConnector1">
+            <a:avLst/>
+          </a:prstGeom>
+          <a:ln>
+            <a:tailEnd type="triangle"/>
+          </a:ln>
+        </p:spPr>
+        <p:style>
+          <a:lnRef idx="1">
+            <a:schemeClr val="dk1"/>
+          </a:lnRef>
+          <a:fillRef idx="0">
+            <a:schemeClr val="dk1"/>
+          </a:fillRef>
+          <a:effectRef idx="0">
+            <a:schemeClr val="dk1"/>
+          </a:effectRef>
+          <a:fontRef idx="minor">
+            <a:schemeClr val="tx1"/>
+          </a:fontRef>
+        </p:style>
+      </p:cxnSp>
+      <p:cxnSp>
+        <p:nvCxnSpPr>
+          <p:cNvPr id="92" name="Straight Arrow Connector 91"/>
+          <p:cNvCxnSpPr>
+            <a:stCxn id="28" idx="5"/>
+            <a:endCxn id="35" idx="1"/>
+          </p:cNvCxnSpPr>
+          <p:nvPr/>
+        </p:nvCxnSpPr>
+        <p:spPr>
+          <a:xfrm>
+            <a:off x="5858473" y="3390996"/>
+            <a:ext cx="328051" cy="292543"/>
+          </a:xfrm>
+          <a:prstGeom prst="straightConnector1">
+            <a:avLst/>
+          </a:prstGeom>
+          <a:ln>
+            <a:tailEnd type="triangle"/>
+          </a:ln>
+        </p:spPr>
+        <p:style>
+          <a:lnRef idx="1">
+            <a:schemeClr val="dk1"/>
+          </a:lnRef>
+          <a:fillRef idx="0">
+            <a:schemeClr val="dk1"/>
+          </a:fillRef>
+          <a:effectRef idx="0">
+            <a:schemeClr val="dk1"/>
+          </a:effectRef>
+          <a:fontRef idx="minor">
+            <a:schemeClr val="tx1"/>
+          </a:fontRef>
+        </p:style>
+      </p:cxnSp>
+      <p:cxnSp>
+        <p:nvCxnSpPr>
+          <p:cNvPr id="94" name="Straight Arrow Connector 93"/>
+          <p:cNvCxnSpPr>
+            <a:stCxn id="34" idx="6"/>
+            <a:endCxn id="35" idx="2"/>
+          </p:cNvCxnSpPr>
+          <p:nvPr/>
+        </p:nvCxnSpPr>
+        <p:spPr>
+          <a:xfrm>
+            <a:off x="5952331" y="3933190"/>
+            <a:ext cx="102235" cy="0"/>
+          </a:xfrm>
+          <a:prstGeom prst="straightConnector1">
+            <a:avLst/>
+          </a:prstGeom>
+          <a:ln>
+            <a:tailEnd type="triangle"/>
+          </a:ln>
+        </p:spPr>
+        <p:style>
+          <a:lnRef idx="1">
+            <a:schemeClr val="dk1"/>
+          </a:lnRef>
+          <a:fillRef idx="0">
+            <a:schemeClr val="dk1"/>
+          </a:fillRef>
+          <a:effectRef idx="0">
+            <a:schemeClr val="dk1"/>
+          </a:effectRef>
+          <a:fontRef idx="minor">
+            <a:schemeClr val="tx1"/>
+          </a:fontRef>
+        </p:style>
+      </p:cxnSp>
+      <p:cxnSp>
+        <p:nvCxnSpPr>
+          <p:cNvPr id="96" name="Straight Arrow Connector 95"/>
+          <p:cNvCxnSpPr>
+            <a:stCxn id="27" idx="7"/>
+            <a:endCxn id="35" idx="3"/>
+          </p:cNvCxnSpPr>
+          <p:nvPr/>
+        </p:nvCxnSpPr>
+        <p:spPr>
+          <a:xfrm flipV="1">
+            <a:off x="5826406" y="4182841"/>
+            <a:ext cx="360118" cy="359218"/>
+          </a:xfrm>
+          <a:prstGeom prst="straightConnector1">
+            <a:avLst/>
+          </a:prstGeom>
+          <a:ln>
+            <a:tailEnd type="triangle"/>
+          </a:ln>
+        </p:spPr>
+        <p:style>
+          <a:lnRef idx="1">
+            <a:schemeClr val="dk1"/>
+          </a:lnRef>
+          <a:fillRef idx="0">
+            <a:schemeClr val="dk1"/>
+          </a:fillRef>
+          <a:effectRef idx="0">
+            <a:schemeClr val="dk1"/>
+          </a:effectRef>
+          <a:fontRef idx="minor">
+            <a:schemeClr val="tx1"/>
+          </a:fontRef>
+        </p:style>
+      </p:cxnSp>
+      <p:cxnSp>
+        <p:nvCxnSpPr>
+          <p:cNvPr id="98" name="Straight Arrow Connector 97"/>
+          <p:cNvCxnSpPr>
+            <a:stCxn id="35" idx="7"/>
+            <a:endCxn id="29" idx="2"/>
+          </p:cNvCxnSpPr>
+          <p:nvPr/>
+        </p:nvCxnSpPr>
+        <p:spPr>
+          <a:xfrm flipV="1">
+            <a:off x="6823673" y="3488690"/>
+            <a:ext cx="256260" cy="194849"/>
+          </a:xfrm>
+          <a:prstGeom prst="straightConnector1">
+            <a:avLst/>
+          </a:prstGeom>
+          <a:ln>
+            <a:tailEnd type="triangle"/>
+          </a:ln>
+        </p:spPr>
+        <p:style>
+          <a:lnRef idx="1">
+            <a:schemeClr val="dk1"/>
+          </a:lnRef>
+          <a:fillRef idx="0">
+            <a:schemeClr val="dk1"/>
+          </a:fillRef>
+          <a:effectRef idx="0">
+            <a:schemeClr val="dk1"/>
+          </a:effectRef>
+          <a:fontRef idx="minor">
+            <a:schemeClr val="tx1"/>
+          </a:fontRef>
+        </p:style>
+      </p:cxnSp>
+      <p:cxnSp>
+        <p:nvCxnSpPr>
+          <p:cNvPr id="100" name="Straight Arrow Connector 99"/>
+          <p:cNvCxnSpPr>
+            <a:stCxn id="35" idx="5"/>
+            <a:endCxn id="36" idx="2"/>
+          </p:cNvCxnSpPr>
+          <p:nvPr/>
+        </p:nvCxnSpPr>
+        <p:spPr>
+          <a:xfrm>
+            <a:off x="6823673" y="4182841"/>
+            <a:ext cx="223115" cy="314229"/>
+          </a:xfrm>
+          <a:prstGeom prst="straightConnector1">
+            <a:avLst/>
+          </a:prstGeom>
+          <a:ln>
+            <a:tailEnd type="triangle"/>
+          </a:ln>
+        </p:spPr>
+        <p:style>
+          <a:lnRef idx="1">
+            <a:schemeClr val="dk1"/>
+          </a:lnRef>
+          <a:fillRef idx="0">
+            <a:schemeClr val="dk1"/>
+          </a:fillRef>
+          <a:effectRef idx="0">
+            <a:schemeClr val="dk1"/>
+          </a:effectRef>
+          <a:fontRef idx="minor">
+            <a:schemeClr val="tx1"/>
+          </a:fontRef>
+        </p:style>
+      </p:cxnSp>
+      <p:cxnSp>
+        <p:nvCxnSpPr>
+          <p:cNvPr id="105" name="Straight Arrow Connector 104"/>
+          <p:cNvCxnSpPr>
+            <a:stCxn id="29" idx="6"/>
+            <a:endCxn id="30" idx="2"/>
+          </p:cNvCxnSpPr>
+          <p:nvPr/>
+        </p:nvCxnSpPr>
+        <p:spPr>
+          <a:xfrm>
+            <a:off x="7980998" y="3488690"/>
+            <a:ext cx="152399" cy="0"/>
+          </a:xfrm>
+          <a:prstGeom prst="straightConnector1">
+            <a:avLst/>
+          </a:prstGeom>
+          <a:ln>
+            <a:tailEnd type="triangle"/>
+          </a:ln>
+        </p:spPr>
+        <p:style>
+          <a:lnRef idx="1">
+            <a:schemeClr val="dk1"/>
+          </a:lnRef>
+          <a:fillRef idx="0">
+            <a:schemeClr val="dk1"/>
+          </a:fillRef>
+          <a:effectRef idx="0">
+            <a:schemeClr val="dk1"/>
+          </a:effectRef>
+          <a:fontRef idx="minor">
+            <a:schemeClr val="tx1"/>
+          </a:fontRef>
+        </p:style>
+      </p:cxnSp>
+      <p:cxnSp>
+        <p:nvCxnSpPr>
+          <p:cNvPr id="107" name="Straight Arrow Connector 106"/>
+          <p:cNvCxnSpPr>
+            <a:stCxn id="36" idx="6"/>
+            <a:endCxn id="37" idx="2"/>
+          </p:cNvCxnSpPr>
+          <p:nvPr/>
+        </p:nvCxnSpPr>
+        <p:spPr>
+          <a:xfrm>
+            <a:off x="7947853" y="4497070"/>
+            <a:ext cx="163477" cy="0"/>
+          </a:xfrm>
+          <a:prstGeom prst="straightConnector1">
+            <a:avLst/>
+          </a:prstGeom>
+          <a:ln>
+            <a:tailEnd type="triangle"/>
+          </a:ln>
+        </p:spPr>
+        <p:style>
+          <a:lnRef idx="1">
+            <a:schemeClr val="dk1"/>
+          </a:lnRef>
+          <a:fillRef idx="0">
+            <a:schemeClr val="dk1"/>
+          </a:fillRef>
+          <a:effectRef idx="0">
+            <a:schemeClr val="dk1"/>
+          </a:effectRef>
+          <a:fontRef idx="minor">
+            <a:schemeClr val="tx1"/>
+          </a:fontRef>
+        </p:style>
+      </p:cxnSp>
+      <p:cxnSp>
+        <p:nvCxnSpPr>
+          <p:cNvPr id="111" name="Straight Arrow Connector 110"/>
+          <p:cNvCxnSpPr>
+            <a:stCxn id="30" idx="6"/>
+            <a:endCxn id="39" idx="1"/>
+          </p:cNvCxnSpPr>
+          <p:nvPr/>
+        </p:nvCxnSpPr>
+        <p:spPr>
+          <a:xfrm>
+            <a:off x="9034462" y="3488690"/>
+            <a:ext cx="237086" cy="194849"/>
+          </a:xfrm>
+          <a:prstGeom prst="straightConnector1">
+            <a:avLst/>
+          </a:prstGeom>
+          <a:ln>
+            <a:tailEnd type="triangle"/>
+          </a:ln>
+        </p:spPr>
+        <p:style>
+          <a:lnRef idx="1">
+            <a:schemeClr val="dk1"/>
+          </a:lnRef>
+          <a:fillRef idx="0">
+            <a:schemeClr val="dk1"/>
+          </a:fillRef>
+          <a:effectRef idx="0">
+            <a:schemeClr val="dk1"/>
+          </a:effectRef>
+          <a:fontRef idx="minor">
+            <a:schemeClr val="tx1"/>
+          </a:fontRef>
+        </p:style>
+      </p:cxnSp>
+      <p:cxnSp>
+        <p:nvCxnSpPr>
+          <p:cNvPr id="113" name="Straight Arrow Connector 112"/>
+          <p:cNvCxnSpPr>
+            <a:stCxn id="37" idx="7"/>
+            <a:endCxn id="39" idx="3"/>
+          </p:cNvCxnSpPr>
+          <p:nvPr/>
+        </p:nvCxnSpPr>
+        <p:spPr>
+          <a:xfrm flipV="1">
+            <a:off x="8880437" y="4182841"/>
+            <a:ext cx="391111" cy="64578"/>
+          </a:xfrm>
+          <a:prstGeom prst="straightConnector1">
+            <a:avLst/>
+          </a:prstGeom>
+          <a:ln>
+            <a:tailEnd type="triangle"/>
+          </a:ln>
+        </p:spPr>
+        <p:style>
+          <a:lnRef idx="1">
+            <a:schemeClr val="dk1"/>
+          </a:lnRef>
+          <a:fillRef idx="0">
+            <a:schemeClr val="dk1"/>
+          </a:fillRef>
+          <a:effectRef idx="0">
+            <a:schemeClr val="dk1"/>
+          </a:effectRef>
+          <a:fontRef idx="minor">
+            <a:schemeClr val="tx1"/>
+          </a:fontRef>
+        </p:style>
+      </p:cxnSp>
+      <p:cxnSp>
+        <p:nvCxnSpPr>
+          <p:cNvPr id="118" name="Straight Arrow Connector 117"/>
+          <p:cNvCxnSpPr>
+            <a:stCxn id="39" idx="6"/>
+            <a:endCxn id="40" idx="3"/>
+          </p:cNvCxnSpPr>
+          <p:nvPr/>
+        </p:nvCxnSpPr>
+        <p:spPr>
+          <a:xfrm flipV="1">
+            <a:off x="10040655" y="3738341"/>
+            <a:ext cx="177166" cy="194849"/>
+          </a:xfrm>
+          <a:prstGeom prst="straightConnector1">
+            <a:avLst/>
+          </a:prstGeom>
+          <a:ln>
+            <a:tailEnd type="triangle"/>
+          </a:ln>
+        </p:spPr>
+        <p:style>
+          <a:lnRef idx="1">
+            <a:schemeClr val="dk1"/>
+          </a:lnRef>
+          <a:fillRef idx="0">
+            <a:schemeClr val="dk1"/>
+          </a:fillRef>
+          <a:effectRef idx="0">
+            <a:schemeClr val="dk1"/>
+          </a:effectRef>
+          <a:fontRef idx="minor">
+            <a:schemeClr val="tx1"/>
+          </a:fontRef>
+        </p:style>
+      </p:cxnSp>
+      <p:cxnSp>
+        <p:nvCxnSpPr>
+          <p:cNvPr id="120" name="Straight Arrow Connector 119"/>
+          <p:cNvCxnSpPr>
+            <a:stCxn id="39" idx="6"/>
+            <a:endCxn id="41" idx="1"/>
+          </p:cNvCxnSpPr>
+          <p:nvPr/>
+        </p:nvCxnSpPr>
+        <p:spPr>
+          <a:xfrm>
+            <a:off x="10040655" y="3933190"/>
+            <a:ext cx="177167" cy="246919"/>
+          </a:xfrm>
+          <a:prstGeom prst="straightConnector1">
+            <a:avLst/>
+          </a:prstGeom>
+          <a:ln>
+            <a:tailEnd type="triangle"/>
+          </a:ln>
+        </p:spPr>
+        <p:style>
+          <a:lnRef idx="1">
+            <a:schemeClr val="dk1"/>
+          </a:lnRef>
+          <a:fillRef idx="0">
+            <a:schemeClr val="dk1"/>
+          </a:fillRef>
+          <a:effectRef idx="0">
+            <a:schemeClr val="dk1"/>
+          </a:effectRef>
+          <a:fontRef idx="minor">
+            <a:schemeClr val="tx1"/>
+          </a:fontRef>
+        </p:style>
+      </p:cxnSp>
+      <p:cxnSp>
+        <p:nvCxnSpPr>
+          <p:cNvPr id="125" name="Straight Arrow Connector 124"/>
+          <p:cNvCxnSpPr>
+            <a:stCxn id="40" idx="5"/>
+            <a:endCxn id="38" idx="2"/>
+          </p:cNvCxnSpPr>
+          <p:nvPr/>
+        </p:nvCxnSpPr>
+        <p:spPr>
+          <a:xfrm>
+            <a:off x="10854970" y="3738341"/>
+            <a:ext cx="250227" cy="194849"/>
+          </a:xfrm>
+          <a:prstGeom prst="straightConnector1">
+            <a:avLst/>
+          </a:prstGeom>
+          <a:ln>
+            <a:tailEnd type="triangle"/>
+          </a:ln>
+        </p:spPr>
+        <p:style>
+          <a:lnRef idx="1">
+            <a:schemeClr val="dk1"/>
+          </a:lnRef>
+          <a:fillRef idx="0">
+            <a:schemeClr val="dk1"/>
+          </a:fillRef>
+          <a:effectRef idx="0">
+            <a:schemeClr val="dk1"/>
+          </a:effectRef>
+          <a:fontRef idx="minor">
+            <a:schemeClr val="tx1"/>
+          </a:fontRef>
+        </p:style>
+      </p:cxnSp>
+      <p:cxnSp>
+        <p:nvCxnSpPr>
+          <p:cNvPr id="128" name="Straight Arrow Connector 127"/>
+          <p:cNvCxnSpPr>
+            <a:stCxn id="41" idx="7"/>
+            <a:endCxn id="38" idx="2"/>
+          </p:cNvCxnSpPr>
+          <p:nvPr/>
+        </p:nvCxnSpPr>
+        <p:spPr>
+          <a:xfrm flipV="1">
+            <a:off x="10854971" y="3933190"/>
+            <a:ext cx="250226" cy="246919"/>
+          </a:xfrm>
+          <a:prstGeom prst="straightConnector1">
+            <a:avLst/>
+          </a:prstGeom>
+          <a:ln>
+            <a:tailEnd type="triangle"/>
+          </a:ln>
+        </p:spPr>
+        <p:style>
+          <a:lnRef idx="1">
+            <a:schemeClr val="dk1"/>
+          </a:lnRef>
+          <a:fillRef idx="0">
+            <a:schemeClr val="dk1"/>
+          </a:fillRef>
+          <a:effectRef idx="0">
+            <a:schemeClr val="dk1"/>
+          </a:effectRef>
+          <a:fontRef idx="minor">
+            <a:schemeClr val="tx1"/>
+          </a:fontRef>
+        </p:style>
+      </p:cxnSp>
     </p:spTree>
     <p:extLst>
       <p:ext uri="{BB962C8B-B14F-4D97-AF65-F5344CB8AC3E}">
-        <p14:creationId xmlns:p14="http://schemas.microsoft.com/office/powerpoint/2010/main" val="4222283958"/>
+        <p14:creationId xmlns:p14="http://schemas.microsoft.com/office/powerpoint/2010/main" val="4205471028"/>
       </p:ext>
     </p:extLst>
   </p:cSld>
   <p:clrMapOvr>
     <a:masterClrMapping/>
   </p:clrMapOvr>
-  <mc:AlternateContent xmlns:mc="http://schemas.openxmlformats.org/markup-compatibility/2006" xmlns:p14="http://schemas.microsoft.com/office/powerpoint/2010/main">
-    <mc:Choice Requires="p14">
+  <mc:AlternateContent xmlns:mc="http://schemas.openxmlformats.org/markup-compatibility/2006">
+    <mc:Choice xmlns:p14="http://schemas.microsoft.com/office/powerpoint/2010/main" Requires="p14">
       <p:transition spd="med" p14:dur="700">
         <p:fade/>
       </p:transition>
     </mc:Choice>
-    <mc:Fallback xmlns="">
+    <mc:Fallback>
       <p:transition spd="med">
         <p:fade/>
       </p:transition>
@@ -5000,10 +7015,48 @@
           <a:chExt cx="0" cy="0"/>
         </a:xfrm>
       </p:grpSpPr>
+      <p:sp>
+        <p:nvSpPr>
+          <p:cNvPr id="6" name="Title 5"/>
+          <p:cNvSpPr>
+            <a:spLocks noGrp="1"/>
+          </p:cNvSpPr>
+          <p:nvPr>
+            <p:ph type="title"/>
+          </p:nvPr>
+        </p:nvSpPr>
+        <p:spPr/>
+        <p:txBody>
+          <a:bodyPr/>
+          <a:lstStyle/>
+          <a:p>
+            <a:endParaRPr lang="en-US"/>
+          </a:p>
+        </p:txBody>
+      </p:sp>
+      <p:sp>
+        <p:nvSpPr>
+          <p:cNvPr id="7" name="Text Placeholder 6"/>
+          <p:cNvSpPr>
+            <a:spLocks noGrp="1"/>
+          </p:cNvSpPr>
+          <p:nvPr>
+            <p:ph type="body" idx="1"/>
+          </p:nvPr>
+        </p:nvSpPr>
+        <p:spPr/>
+        <p:txBody>
+          <a:bodyPr/>
+          <a:lstStyle/>
+          <a:p>
+            <a:endParaRPr lang="en-US"/>
+          </a:p>
+        </p:txBody>
+      </p:sp>
     </p:spTree>
     <p:extLst>
       <p:ext uri="{BB962C8B-B14F-4D97-AF65-F5344CB8AC3E}">
-        <p14:creationId xmlns:p14="http://schemas.microsoft.com/office/powerpoint/2010/main" val="1400644211"/>
+        <p14:creationId xmlns:p14="http://schemas.microsoft.com/office/powerpoint/2010/main" val="843864697"/>
       </p:ext>
     </p:extLst>
   </p:cSld>
@@ -5070,12 +7123,12 @@
       </p:sp>
       <p:sp>
         <p:nvSpPr>
-          <p:cNvPr id="3" name="Content Placeholder 2"/>
+          <p:cNvPr id="3" name="Text Placeholder 2"/>
           <p:cNvSpPr>
             <a:spLocks noGrp="1"/>
           </p:cNvSpPr>
           <p:nvPr>
-            <p:ph idx="1"/>
+            <p:ph type="body" idx="1"/>
           </p:nvPr>
         </p:nvSpPr>
         <p:spPr/>
@@ -5089,12 +7142,50 @@
       </p:sp>
       <p:sp>
         <p:nvSpPr>
-          <p:cNvPr id="4" name="Text Placeholder 3"/>
+          <p:cNvPr id="5" name="Text Placeholder 4"/>
           <p:cNvSpPr>
             <a:spLocks noGrp="1"/>
           </p:cNvSpPr>
           <p:nvPr>
-            <p:ph type="body" sz="half" idx="2"/>
+            <p:ph type="body" sz="quarter" idx="3"/>
+          </p:nvPr>
+        </p:nvSpPr>
+        <p:spPr/>
+        <p:txBody>
+          <a:bodyPr/>
+          <a:lstStyle/>
+          <a:p>
+            <a:endParaRPr lang="en-US"/>
+          </a:p>
+        </p:txBody>
+      </p:sp>
+      <p:sp>
+        <p:nvSpPr>
+          <p:cNvPr id="6" name="Content Placeholder 5"/>
+          <p:cNvSpPr>
+            <a:spLocks noGrp="1"/>
+          </p:cNvSpPr>
+          <p:nvPr>
+            <p:ph sz="quarter" idx="4"/>
+          </p:nvPr>
+        </p:nvSpPr>
+        <p:spPr/>
+        <p:txBody>
+          <a:bodyPr/>
+          <a:lstStyle/>
+          <a:p>
+            <a:endParaRPr lang="en-US"/>
+          </a:p>
+        </p:txBody>
+      </p:sp>
+      <p:sp>
+        <p:nvSpPr>
+          <p:cNvPr id="12" name="Content Placeholder 11"/>
+          <p:cNvSpPr>
+            <a:spLocks noGrp="1"/>
+          </p:cNvSpPr>
+          <p:nvPr>
+            <p:ph sz="half" idx="2"/>
           </p:nvPr>
         </p:nvSpPr>
         <p:spPr/>
@@ -5109,106 +7200,7 @@
     </p:spTree>
     <p:extLst>
       <p:ext uri="{BB962C8B-B14F-4D97-AF65-F5344CB8AC3E}">
-        <p14:creationId xmlns:p14="http://schemas.microsoft.com/office/powerpoint/2010/main" val="2317441537"/>
-      </p:ext>
-    </p:extLst>
-  </p:cSld>
-  <p:clrMapOvr>
-    <a:masterClrMapping/>
-  </p:clrMapOvr>
-  <mc:AlternateContent xmlns:mc="http://schemas.openxmlformats.org/markup-compatibility/2006" xmlns:p14="http://schemas.microsoft.com/office/powerpoint/2010/main">
-    <mc:Choice Requires="p14">
-      <p:transition spd="med" p14:dur="700">
-        <p:fade/>
-      </p:transition>
-    </mc:Choice>
-    <mc:Fallback xmlns="">
-      <p:transition spd="med">
-        <p:fade/>
-      </p:transition>
-    </mc:Fallback>
-  </mc:AlternateContent>
-  <p:timing>
-    <p:tnLst>
-      <p:par>
-        <p:cTn id="1" dur="indefinite" restart="never" nodeType="tmRoot"/>
-      </p:par>
-    </p:tnLst>
-  </p:timing>
-</p:sld>
-</file>
-
-<file path=ppt/slides/slide13.xml><?xml version="1.0" encoding="utf-8"?>
-<p:sld xmlns:a="http://schemas.openxmlformats.org/drawingml/2006/main" xmlns:r="http://schemas.openxmlformats.org/officeDocument/2006/relationships" xmlns:p="http://schemas.openxmlformats.org/presentationml/2006/main">
-  <p:cSld>
-    <p:spTree>
-      <p:nvGrpSpPr>
-        <p:cNvPr id="1" name=""/>
-        <p:cNvGrpSpPr/>
-        <p:nvPr/>
-      </p:nvGrpSpPr>
-      <p:grpSpPr>
-        <a:xfrm>
-          <a:off x="0" y="0"/>
-          <a:ext cx="0" cy="0"/>
-          <a:chOff x="0" y="0"/>
-          <a:chExt cx="0" cy="0"/>
-        </a:xfrm>
-      </p:grpSpPr>
-      <p:sp>
-        <p:nvSpPr>
-          <p:cNvPr id="2" name="Title 1"/>
-          <p:cNvSpPr>
-            <a:spLocks noGrp="1"/>
-          </p:cNvSpPr>
-          <p:nvPr>
-            <p:ph type="title"/>
-          </p:nvPr>
-        </p:nvSpPr>
-        <p:spPr/>
-        <p:txBody>
-          <a:bodyPr/>
-          <a:lstStyle/>
-          <a:p>
-            <a:endParaRPr lang="en-US"/>
-          </a:p>
-        </p:txBody>
-      </p:sp>
-      <p:sp>
-        <p:nvSpPr>
-          <p:cNvPr id="3" name="Picture Placeholder 2"/>
-          <p:cNvSpPr>
-            <a:spLocks noGrp="1"/>
-          </p:cNvSpPr>
-          <p:nvPr>
-            <p:ph type="pic" idx="1"/>
-          </p:nvPr>
-        </p:nvSpPr>
-        <p:spPr/>
-      </p:sp>
-      <p:sp>
-        <p:nvSpPr>
-          <p:cNvPr id="4" name="Text Placeholder 3"/>
-          <p:cNvSpPr>
-            <a:spLocks noGrp="1"/>
-          </p:cNvSpPr>
-          <p:nvPr>
-            <p:ph type="body" sz="half" idx="2"/>
-          </p:nvPr>
-        </p:nvSpPr>
-        <p:spPr/>
-        <p:txBody>
-          <a:bodyPr/>
-          <a:lstStyle/>
-          <a:p>
-            <a:endParaRPr lang="en-US"/>
-          </a:p>
-        </p:txBody>
-      </p:sp>
-    </p:spTree>
-    <p:extLst>
-      <p:ext uri="{BB962C8B-B14F-4D97-AF65-F5344CB8AC3E}">
-        <p14:creationId xmlns:p14="http://schemas.microsoft.com/office/powerpoint/2010/main" val="3262952730"/>
+        <p14:creationId xmlns:p14="http://schemas.microsoft.com/office/powerpoint/2010/main" val="3941871670"/>
       </p:ext>
     </p:extLst>
   </p:cSld>
@@ -5607,7 +7599,6 @@
               <a:rPr lang="en-US" dirty="0" smtClean="0"/>
               <a:t>accountant</a:t>
             </a:r>
-            <a:endParaRPr lang="en-US" dirty="0" smtClean="0"/>
           </a:p>
           <a:p>
             <a:r>
@@ -5627,11 +7618,7 @@
             </a:r>
             <a:r>
               <a:rPr lang="en-US" dirty="0"/>
-              <a:t>gun to mobile </a:t>
-            </a:r>
-            <a:r>
-              <a:rPr lang="en-US" dirty="0"/>
-              <a:t>a</a:t>
+              <a:t>gun to mobile a</a:t>
             </a:r>
             <a:r>
               <a:rPr lang="en-US" dirty="0" smtClean="0"/>
@@ -5792,13 +7779,13 @@
   <p:clrMapOvr>
     <a:masterClrMapping/>
   </p:clrMapOvr>
-  <mc:AlternateContent xmlns:mc="http://schemas.openxmlformats.org/markup-compatibility/2006">
-    <mc:Choice xmlns:p14="http://schemas.microsoft.com/office/powerpoint/2010/main" Requires="p14">
+  <mc:AlternateContent xmlns:mc="http://schemas.openxmlformats.org/markup-compatibility/2006" xmlns:p14="http://schemas.microsoft.com/office/powerpoint/2010/main">
+    <mc:Choice Requires="p14">
       <p:transition spd="med" p14:dur="700">
         <p:fade/>
       </p:transition>
     </mc:Choice>
-    <mc:Fallback>
+    <mc:Fallback xmlns="">
       <p:transition spd="med">
         <p:fade/>
       </p:transition>
@@ -5855,7 +7842,6 @@
               <a:rPr lang="en-US" sz="3100" dirty="0"/>
               <a:t>Mockups</a:t>
             </a:r>
-            <a:endParaRPr lang="en-US" sz="3100" dirty="0"/>
           </a:p>
         </p:txBody>
       </p:sp>
@@ -5898,13 +7884,13 @@
   <p:clrMapOvr>
     <a:masterClrMapping/>
   </p:clrMapOvr>
-  <mc:AlternateContent xmlns:mc="http://schemas.openxmlformats.org/markup-compatibility/2006">
-    <mc:Choice xmlns:p14="http://schemas.microsoft.com/office/powerpoint/2010/main" Requires="p14">
+  <mc:AlternateContent xmlns:mc="http://schemas.openxmlformats.org/markup-compatibility/2006" xmlns:p14="http://schemas.microsoft.com/office/powerpoint/2010/main">
+    <mc:Choice Requires="p14">
       <p:transition spd="med" p14:dur="700">
         <p:fade/>
       </p:transition>
     </mc:Choice>
-    <mc:Fallback>
+    <mc:Fallback xmlns="">
       <p:transition spd="med">
         <p:fade/>
       </p:transition>
@@ -5962,39 +7948,208 @@
       </p:sp>
       <p:sp>
         <p:nvSpPr>
-          <p:cNvPr id="3" name="Content Placeholder 2"/>
-          <p:cNvSpPr>
-            <a:spLocks noGrp="1"/>
-          </p:cNvSpPr>
-          <p:nvPr>
-            <p:ph sz="half" idx="1"/>
-          </p:nvPr>
-        </p:nvSpPr>
-        <p:spPr/>
-        <p:txBody>
-          <a:bodyPr/>
+          <p:cNvPr id="10" name="Rectangle 8"/>
+          <p:cNvSpPr>
+            <a:spLocks noChangeArrowheads="1"/>
+          </p:cNvSpPr>
+          <p:nvPr/>
+        </p:nvSpPr>
+        <p:spPr bwMode="auto">
+          <a:xfrm>
+            <a:off x="4635500" y="-419100"/>
+            <a:ext cx="12192000" cy="0"/>
+          </a:xfrm>
+          <a:prstGeom prst="rect">
+            <a:avLst/>
+          </a:prstGeom>
+          <a:noFill/>
+          <a:ln>
+            <a:noFill/>
+          </a:ln>
+          <a:effectLst/>
+          <a:extLst>
+            <a:ext uri="{909E8E84-426E-40DD-AFC4-6F175D3DCCD1}">
+              <a14:hiddenFill xmlns:a14="http://schemas.microsoft.com/office/drawing/2010/main">
+                <a:solidFill>
+                  <a:schemeClr val="accent1"/>
+                </a:solidFill>
+              </a14:hiddenFill>
+            </a:ext>
+            <a:ext uri="{91240B29-F687-4F45-9708-019B960494DF}">
+              <a14:hiddenLine xmlns:a14="http://schemas.microsoft.com/office/drawing/2010/main" w="9525">
+                <a:solidFill>
+                  <a:schemeClr val="tx1"/>
+                </a:solidFill>
+                <a:miter lim="800000"/>
+                <a:headEnd/>
+                <a:tailEnd/>
+              </a14:hiddenLine>
+            </a:ext>
+            <a:ext uri="{AF507438-7753-43E0-B8FC-AC1667EBCBE1}">
+              <a14:hiddenEffects xmlns:a14="http://schemas.microsoft.com/office/drawing/2010/main">
+                <a:effectLst>
+                  <a:outerShdw dist="35921" dir="2700000" algn="ctr" rotWithShape="0">
+                    <a:schemeClr val="bg2"/>
+                  </a:outerShdw>
+                </a:effectLst>
+              </a14:hiddenEffects>
+            </a:ext>
+          </a:extLst>
+        </p:spPr>
+        <p:txBody>
+          <a:bodyPr vert="horz" wrap="none" lIns="91440" tIns="45720" rIns="91440" bIns="45720" numCol="1" anchor="ctr" anchorCtr="0" compatLnSpc="1">
+            <a:prstTxWarp prst="textNoShape">
+              <a:avLst/>
+            </a:prstTxWarp>
+            <a:spAutoFit/>
+          </a:bodyPr>
           <a:lstStyle/>
           <a:p>
-            <a:r>
-              <a:rPr lang="en-US" dirty="0" smtClean="0"/>
-              <a:t>First bullet point here</a:t>
-            </a:r>
-          </a:p>
-          <a:p>
-            <a:r>
-              <a:rPr lang="en-US" dirty="0" smtClean="0"/>
-              <a:t>Second bullet point here</a:t>
-            </a:r>
-          </a:p>
-          <a:p>
-            <a:r>
-              <a:rPr lang="en-US" dirty="0" smtClean="0"/>
-              <a:t>Third bullet point here</a:t>
-            </a:r>
-            <a:endParaRPr lang="en-US" dirty="0"/>
-          </a:p>
-        </p:txBody>
-      </p:sp>
+            <a:endParaRPr lang="en-US"/>
+          </a:p>
+        </p:txBody>
+      </p:sp>
+      <p:graphicFrame>
+        <p:nvGraphicFramePr>
+          <p:cNvPr id="11" name="Object 10"/>
+          <p:cNvGraphicFramePr>
+            <a:graphicFrameLocks noChangeAspect="1"/>
+          </p:cNvGraphicFramePr>
+          <p:nvPr>
+            <p:extLst>
+              <p:ext uri="{D42A27DB-BD31-4B8C-83A1-F6EECF244321}">
+                <p14:modId xmlns:p14="http://schemas.microsoft.com/office/powerpoint/2010/main" val="1303253792"/>
+              </p:ext>
+            </p:extLst>
+          </p:nvPr>
+        </p:nvGraphicFramePr>
+        <p:xfrm>
+          <a:off x="4635500" y="241300"/>
+          <a:ext cx="5934075" cy="6102350"/>
+        </p:xfrm>
+        <a:graphic>
+          <a:graphicData uri="http://schemas.openxmlformats.org/presentationml/2006/ole">
+            <mc:AlternateContent xmlns:mc="http://schemas.openxmlformats.org/markup-compatibility/2006">
+              <mc:Choice xmlns:v="urn:schemas-microsoft-com:vml" Requires="v">
+                <p:oleObj spid="_x0000_s1041" name="Visio" r:id="rId4" imgW="5934110" imgH="6762646" progId="Visio.Drawing.15">
+                  <p:embed/>
+                </p:oleObj>
+              </mc:Choice>
+              <mc:Fallback>
+                <p:oleObj name="Visio" r:id="rId4" imgW="5934110" imgH="6762646" progId="Visio.Drawing.15">
+                  <p:embed/>
+                  <p:pic>
+                    <p:nvPicPr>
+                      <p:cNvPr id="0" name="Object 7"/>
+                      <p:cNvPicPr>
+                        <a:picLocks noChangeAspect="1" noChangeArrowheads="1"/>
+                      </p:cNvPicPr>
+                      <p:nvPr/>
+                    </p:nvPicPr>
+                    <p:blipFill>
+                      <a:blip r:embed="rId5">
+                        <a:extLst>
+                          <a:ext uri="{28A0092B-C50C-407E-A947-70E740481C1C}">
+                            <a14:useLocalDpi xmlns:a14="http://schemas.microsoft.com/office/drawing/2010/main" val="0"/>
+                          </a:ext>
+                        </a:extLst>
+                      </a:blip>
+                      <a:srcRect/>
+                      <a:stretch>
+                        <a:fillRect/>
+                      </a:stretch>
+                    </p:blipFill>
+                    <p:spPr bwMode="auto">
+                      <a:xfrm>
+                        <a:off x="4635500" y="241300"/>
+                        <a:ext cx="5934075" cy="6102350"/>
+                      </a:xfrm>
+                      <a:prstGeom prst="rect">
+                        <a:avLst/>
+                      </a:prstGeom>
+                      <a:noFill/>
+                    </p:spPr>
+                  </p:pic>
+                </p:oleObj>
+              </mc:Fallback>
+            </mc:AlternateContent>
+          </a:graphicData>
+        </a:graphic>
+      </p:graphicFrame>
+      <p:cxnSp>
+        <p:nvCxnSpPr>
+          <p:cNvPr id="13" name="Straight Connector 12"/>
+          <p:cNvCxnSpPr/>
+          <p:nvPr/>
+        </p:nvCxnSpPr>
+        <p:spPr>
+          <a:xfrm>
+            <a:off x="6921500" y="685800"/>
+            <a:ext cx="1346200" cy="127000"/>
+          </a:xfrm>
+          <a:prstGeom prst="line">
+            <a:avLst/>
+          </a:prstGeom>
+          <a:ln>
+            <a:solidFill>
+              <a:schemeClr val="accent5">
+                <a:lumMod val="75000"/>
+              </a:schemeClr>
+            </a:solidFill>
+          </a:ln>
+        </p:spPr>
+        <p:style>
+          <a:lnRef idx="1">
+            <a:schemeClr val="dk1"/>
+          </a:lnRef>
+          <a:fillRef idx="0">
+            <a:schemeClr val="dk1"/>
+          </a:fillRef>
+          <a:effectRef idx="0">
+            <a:schemeClr val="dk1"/>
+          </a:effectRef>
+          <a:fontRef idx="minor">
+            <a:schemeClr val="tx1"/>
+          </a:fontRef>
+        </p:style>
+      </p:cxnSp>
+      <p:cxnSp>
+        <p:nvCxnSpPr>
+          <p:cNvPr id="15" name="Straight Connector 14"/>
+          <p:cNvCxnSpPr/>
+          <p:nvPr/>
+        </p:nvCxnSpPr>
+        <p:spPr>
+          <a:xfrm flipH="1">
+            <a:off x="7277100" y="1993900"/>
+            <a:ext cx="990600" cy="952500"/>
+          </a:xfrm>
+          <a:prstGeom prst="line">
+            <a:avLst/>
+          </a:prstGeom>
+          <a:ln>
+            <a:solidFill>
+              <a:schemeClr val="accent5">
+                <a:lumMod val="75000"/>
+              </a:schemeClr>
+            </a:solidFill>
+          </a:ln>
+        </p:spPr>
+        <p:style>
+          <a:lnRef idx="1">
+            <a:schemeClr val="dk1"/>
+          </a:lnRef>
+          <a:fillRef idx="0">
+            <a:schemeClr val="dk1"/>
+          </a:fillRef>
+          <a:effectRef idx="0">
+            <a:schemeClr val="dk1"/>
+          </a:effectRef>
+          <a:fontRef idx="minor">
+            <a:schemeClr val="tx1"/>
+          </a:fontRef>
+        </p:style>
+      </p:cxnSp>
     </p:spTree>
     <p:extLst>
       <p:ext uri="{BB962C8B-B14F-4D97-AF65-F5344CB8AC3E}">
@@ -6046,7 +8201,7 @@
       </p:grpSpPr>
       <p:sp>
         <p:nvSpPr>
-          <p:cNvPr id="6" name="Title 5"/>
+          <p:cNvPr id="2" name="Title 1"/>
           <p:cNvSpPr>
             <a:spLocks noGrp="1"/>
           </p:cNvSpPr>
@@ -6059,46 +8214,161 @@
           <a:bodyPr/>
           <a:lstStyle/>
           <a:p>
+            <a:r>
+              <a:rPr lang="en-US" dirty="0" smtClean="0"/>
+              <a:t>Design</a:t>
+            </a:r>
+            <a:endParaRPr lang="en-US" dirty="0"/>
+          </a:p>
+        </p:txBody>
+      </p:sp>
+      <p:sp>
+        <p:nvSpPr>
+          <p:cNvPr id="5" name="Rectangle 2"/>
+          <p:cNvSpPr>
+            <a:spLocks noChangeArrowheads="1"/>
+          </p:cNvSpPr>
+          <p:nvPr/>
+        </p:nvSpPr>
+        <p:spPr bwMode="auto">
+          <a:xfrm flipV="1">
+            <a:off x="3498305" y="2101013"/>
+            <a:ext cx="13912129" cy="45719"/>
+          </a:xfrm>
+          <a:prstGeom prst="rect">
+            <a:avLst/>
+          </a:prstGeom>
+          <a:noFill/>
+          <a:ln>
+            <a:noFill/>
+          </a:ln>
+          <a:effectLst/>
+          <a:extLst>
+            <a:ext uri="{909E8E84-426E-40DD-AFC4-6F175D3DCCD1}">
+              <a14:hiddenFill xmlns:a14="http://schemas.microsoft.com/office/drawing/2010/main">
+                <a:solidFill>
+                  <a:schemeClr val="accent1"/>
+                </a:solidFill>
+              </a14:hiddenFill>
+            </a:ext>
+            <a:ext uri="{91240B29-F687-4F45-9708-019B960494DF}">
+              <a14:hiddenLine xmlns:a14="http://schemas.microsoft.com/office/drawing/2010/main" w="9525">
+                <a:solidFill>
+                  <a:schemeClr val="tx1"/>
+                </a:solidFill>
+                <a:miter lim="800000"/>
+                <a:headEnd/>
+                <a:tailEnd/>
+              </a14:hiddenLine>
+            </a:ext>
+            <a:ext uri="{AF507438-7753-43E0-B8FC-AC1667EBCBE1}">
+              <a14:hiddenEffects xmlns:a14="http://schemas.microsoft.com/office/drawing/2010/main">
+                <a:effectLst>
+                  <a:outerShdw dist="35921" dir="2700000" algn="ctr" rotWithShape="0">
+                    <a:schemeClr val="bg2"/>
+                  </a:outerShdw>
+                </a:effectLst>
+              </a14:hiddenEffects>
+            </a:ext>
+          </a:extLst>
+        </p:spPr>
+        <p:txBody>
+          <a:bodyPr vert="horz" wrap="square" lIns="91440" tIns="45720" rIns="91440" bIns="45720" numCol="1" anchor="ctr" anchorCtr="0" compatLnSpc="1">
+            <a:prstTxWarp prst="textNoShape">
+              <a:avLst/>
+            </a:prstTxWarp>
+            <a:spAutoFit/>
+          </a:bodyPr>
+          <a:lstStyle/>
+          <a:p>
             <a:endParaRPr lang="en-US"/>
           </a:p>
         </p:txBody>
       </p:sp>
-      <p:sp>
-        <p:nvSpPr>
-          <p:cNvPr id="7" name="Text Placeholder 6"/>
-          <p:cNvSpPr>
-            <a:spLocks noGrp="1"/>
-          </p:cNvSpPr>
-          <p:nvPr>
-            <p:ph type="body" idx="1"/>
-          </p:nvPr>
-        </p:nvSpPr>
-        <p:spPr/>
-        <p:txBody>
-          <a:bodyPr/>
-          <a:lstStyle/>
-          <a:p>
-            <a:endParaRPr lang="en-US"/>
-          </a:p>
-        </p:txBody>
-      </p:sp>
+      <p:graphicFrame>
+        <p:nvGraphicFramePr>
+          <p:cNvPr id="6" name="Object 5"/>
+          <p:cNvGraphicFramePr>
+            <a:graphicFrameLocks noChangeAspect="1"/>
+          </p:cNvGraphicFramePr>
+          <p:nvPr>
+            <p:extLst>
+              <p:ext uri="{D42A27DB-BD31-4B8C-83A1-F6EECF244321}">
+                <p14:modId xmlns:p14="http://schemas.microsoft.com/office/powerpoint/2010/main" val="3555816761"/>
+              </p:ext>
+            </p:extLst>
+          </p:nvPr>
+        </p:nvGraphicFramePr>
+        <p:xfrm>
+          <a:off x="3498305" y="1700784"/>
+          <a:ext cx="6886031" cy="2924356"/>
+        </p:xfrm>
+        <a:graphic>
+          <a:graphicData uri="http://schemas.openxmlformats.org/presentationml/2006/ole">
+            <mc:AlternateContent xmlns:mc="http://schemas.openxmlformats.org/markup-compatibility/2006">
+              <mc:Choice xmlns:v="urn:schemas-microsoft-com:vml" Requires="v">
+                <p:oleObj spid="_x0000_s2059" name="Visio" r:id="rId3" imgW="7219839" imgH="3066985" progId="Visio.Drawing.15">
+                  <p:embed/>
+                </p:oleObj>
+              </mc:Choice>
+              <mc:Fallback>
+                <p:oleObj name="Visio" r:id="rId3" imgW="7219839" imgH="3066985" progId="Visio.Drawing.15">
+                  <p:embed/>
+                  <p:pic>
+                    <p:nvPicPr>
+                      <p:cNvPr id="0" name="Object 1"/>
+                      <p:cNvPicPr>
+                        <a:picLocks noChangeAspect="1" noChangeArrowheads="1"/>
+                      </p:cNvPicPr>
+                      <p:nvPr/>
+                    </p:nvPicPr>
+                    <p:blipFill>
+                      <a:blip r:embed="rId4">
+                        <a:extLst>
+                          <a:ext uri="{28A0092B-C50C-407E-A947-70E740481C1C}">
+                            <a14:useLocalDpi xmlns:a14="http://schemas.microsoft.com/office/drawing/2010/main" val="0"/>
+                          </a:ext>
+                        </a:extLst>
+                      </a:blip>
+                      <a:srcRect/>
+                      <a:stretch>
+                        <a:fillRect/>
+                      </a:stretch>
+                    </p:blipFill>
+                    <p:spPr bwMode="auto">
+                      <a:xfrm>
+                        <a:off x="3498305" y="1700784"/>
+                        <a:ext cx="6886031" cy="2924356"/>
+                      </a:xfrm>
+                      <a:prstGeom prst="rect">
+                        <a:avLst/>
+                      </a:prstGeom>
+                      <a:noFill/>
+                    </p:spPr>
+                  </p:pic>
+                </p:oleObj>
+              </mc:Fallback>
+            </mc:AlternateContent>
+          </a:graphicData>
+        </a:graphic>
+      </p:graphicFrame>
     </p:spTree>
     <p:extLst>
       <p:ext uri="{BB962C8B-B14F-4D97-AF65-F5344CB8AC3E}">
-        <p14:creationId xmlns:p14="http://schemas.microsoft.com/office/powerpoint/2010/main" val="843864697"/>
+        <p14:creationId xmlns:p14="http://schemas.microsoft.com/office/powerpoint/2010/main" val="4054934794"/>
       </p:ext>
     </p:extLst>
   </p:cSld>
   <p:clrMapOvr>
     <a:masterClrMapping/>
   </p:clrMapOvr>
-  <mc:AlternateContent xmlns:mc="http://schemas.openxmlformats.org/markup-compatibility/2006" xmlns:p14="http://schemas.microsoft.com/office/powerpoint/2010/main">
-    <mc:Choice Requires="p14">
+  <mc:AlternateContent xmlns:mc="http://schemas.openxmlformats.org/markup-compatibility/2006">
+    <mc:Choice xmlns:p14="http://schemas.microsoft.com/office/powerpoint/2010/main" Requires="p14">
       <p:transition spd="med" p14:dur="700">
         <p:fade/>
       </p:transition>
     </mc:Choice>
-    <mc:Fallback xmlns="">
+    <mc:Fallback>
       <p:transition spd="med">
         <p:fade/>
       </p:transition>
@@ -6141,108 +8411,663 @@
             <p:ph type="title"/>
           </p:nvPr>
         </p:nvSpPr>
-        <p:spPr/>
+        <p:spPr>
+          <a:xfrm>
+            <a:off x="502920" y="447771"/>
+            <a:ext cx="9509760" cy="599440"/>
+          </a:xfrm>
+        </p:spPr>
         <p:txBody>
           <a:bodyPr/>
           <a:lstStyle/>
           <a:p>
-            <a:endParaRPr lang="en-US"/>
-          </a:p>
-        </p:txBody>
-      </p:sp>
-      <p:sp>
-        <p:nvSpPr>
-          <p:cNvPr id="3" name="Text Placeholder 2"/>
+            <a:r>
+              <a:rPr lang="en-US" dirty="0" smtClean="0"/>
+              <a:t>List of tasks</a:t>
+            </a:r>
+            <a:endParaRPr lang="en-US" dirty="0"/>
+          </a:p>
+        </p:txBody>
+      </p:sp>
+      <p:sp>
+        <p:nvSpPr>
+          <p:cNvPr id="3" name="Content Placeholder 2"/>
           <p:cNvSpPr>
             <a:spLocks noGrp="1"/>
           </p:cNvSpPr>
           <p:nvPr>
-            <p:ph type="body" idx="1"/>
-          </p:nvPr>
-        </p:nvSpPr>
-        <p:spPr/>
-        <p:txBody>
-          <a:bodyPr/>
+            <p:ph sz="half" idx="1"/>
+          </p:nvPr>
+        </p:nvSpPr>
+        <p:spPr>
+          <a:xfrm>
+            <a:off x="177800" y="1723500"/>
+            <a:ext cx="6045200" cy="4123944"/>
+          </a:xfrm>
+        </p:spPr>
+        <p:txBody>
+          <a:bodyPr>
+            <a:normAutofit fontScale="85000" lnSpcReduction="10000"/>
+          </a:bodyPr>
           <a:lstStyle/>
           <a:p>
-            <a:endParaRPr lang="en-US"/>
-          </a:p>
-        </p:txBody>
-      </p:sp>
-      <p:sp>
-        <p:nvSpPr>
-          <p:cNvPr id="5" name="Text Placeholder 4"/>
-          <p:cNvSpPr>
-            <a:spLocks noGrp="1"/>
-          </p:cNvSpPr>
-          <p:nvPr>
-            <p:ph type="body" sz="quarter" idx="3"/>
-          </p:nvPr>
-        </p:nvSpPr>
-        <p:spPr/>
-        <p:txBody>
-          <a:bodyPr/>
+            <a:pPr marL="45720" indent="0">
+              <a:lnSpc>
+                <a:spcPct val="120000"/>
+              </a:lnSpc>
+              <a:spcBef>
+                <a:spcPts val="0"/>
+              </a:spcBef>
+              <a:buNone/>
+            </a:pPr>
+            <a:r>
+              <a:rPr lang="en-US" sz="2100" dirty="0"/>
+              <a:t>1. Gather Requirements </a:t>
+            </a:r>
+            <a:r>
+              <a:rPr lang="en-US" sz="2100" dirty="0" smtClean="0"/>
+              <a:t>(1)</a:t>
+            </a:r>
+          </a:p>
+          <a:p>
+            <a:pPr marL="45720" indent="0">
+              <a:lnSpc>
+                <a:spcPct val="120000"/>
+              </a:lnSpc>
+              <a:spcBef>
+                <a:spcPts val="0"/>
+              </a:spcBef>
+              <a:buNone/>
+            </a:pPr>
+            <a:r>
+              <a:rPr lang="en-US" sz="2100" dirty="0" smtClean="0"/>
+              <a:t>2</a:t>
+            </a:r>
+            <a:r>
+              <a:rPr lang="en-US" sz="2100" dirty="0"/>
+              <a:t>. Record Requirements (Requirement Specification </a:t>
+            </a:r>
+            <a:r>
+              <a:rPr lang="en-US" sz="2100" dirty="0" smtClean="0"/>
+              <a:t>Sheet</a:t>
+            </a:r>
+            <a:r>
+              <a:rPr lang="en-US" sz="2100" dirty="0"/>
+              <a:t> </a:t>
+            </a:r>
+            <a:r>
+              <a:rPr lang="en-US" sz="2100" dirty="0" smtClean="0"/>
+              <a:t>(2)  </a:t>
+            </a:r>
+          </a:p>
+          <a:p>
+            <a:pPr marL="45720" indent="0">
+              <a:lnSpc>
+                <a:spcPct val="120000"/>
+              </a:lnSpc>
+              <a:spcBef>
+                <a:spcPts val="0"/>
+              </a:spcBef>
+              <a:buNone/>
+            </a:pPr>
+            <a:r>
+              <a:rPr lang="en-US" sz="2100" dirty="0" smtClean="0"/>
+              <a:t>3</a:t>
+            </a:r>
+            <a:r>
+              <a:rPr lang="en-US" sz="2100" dirty="0"/>
+              <a:t>. Create </a:t>
+            </a:r>
+            <a:r>
+              <a:rPr lang="en-US" sz="2100" dirty="0" err="1"/>
+              <a:t>Moqups</a:t>
+            </a:r>
+            <a:r>
+              <a:rPr lang="en-US" sz="2100" dirty="0"/>
+              <a:t> for User Interfaces </a:t>
+            </a:r>
+            <a:r>
+              <a:rPr lang="en-US" sz="2100" dirty="0" smtClean="0"/>
+              <a:t>(3a)</a:t>
+            </a:r>
+          </a:p>
+          <a:p>
+            <a:pPr marL="45720" indent="0">
+              <a:lnSpc>
+                <a:spcPct val="120000"/>
+              </a:lnSpc>
+              <a:spcBef>
+                <a:spcPts val="0"/>
+              </a:spcBef>
+              <a:buNone/>
+            </a:pPr>
+            <a:r>
+              <a:rPr lang="en-US" sz="2100" dirty="0" smtClean="0"/>
+              <a:t>4</a:t>
+            </a:r>
+            <a:r>
+              <a:rPr lang="en-US" sz="2100" dirty="0"/>
+              <a:t>. Set up repository </a:t>
+            </a:r>
+            <a:r>
+              <a:rPr lang="en-US" sz="2100" dirty="0" smtClean="0"/>
+              <a:t>(3b)</a:t>
+            </a:r>
+          </a:p>
+          <a:p>
+            <a:pPr marL="45720" indent="0">
+              <a:lnSpc>
+                <a:spcPct val="120000"/>
+              </a:lnSpc>
+              <a:spcBef>
+                <a:spcPts val="0"/>
+              </a:spcBef>
+              <a:buNone/>
+            </a:pPr>
+            <a:r>
+              <a:rPr lang="en-US" sz="2100" dirty="0" smtClean="0"/>
+              <a:t>5</a:t>
+            </a:r>
+            <a:r>
+              <a:rPr lang="en-US" sz="2100" dirty="0"/>
+              <a:t>. Research Databases that can connect with iOS </a:t>
+            </a:r>
+            <a:r>
+              <a:rPr lang="en-US" sz="2100" dirty="0" smtClean="0"/>
+              <a:t>and desktop </a:t>
+            </a:r>
+            <a:r>
+              <a:rPr lang="en-US" sz="2100" dirty="0"/>
+              <a:t>applications </a:t>
+            </a:r>
+            <a:r>
+              <a:rPr lang="en-US" sz="2100" dirty="0" smtClean="0"/>
+              <a:t> (3c)</a:t>
+            </a:r>
+          </a:p>
+          <a:p>
+            <a:pPr marL="45720" indent="0">
+              <a:lnSpc>
+                <a:spcPct val="120000"/>
+              </a:lnSpc>
+              <a:spcBef>
+                <a:spcPts val="0"/>
+              </a:spcBef>
+              <a:buNone/>
+            </a:pPr>
+            <a:r>
+              <a:rPr lang="en-US" sz="2100" dirty="0" smtClean="0"/>
+              <a:t>6.Create </a:t>
+            </a:r>
+            <a:r>
+              <a:rPr lang="en-US" sz="2100" dirty="0"/>
+              <a:t>a design for the system</a:t>
+            </a:r>
+            <a:r>
+              <a:rPr lang="en-US" sz="2100" dirty="0" smtClean="0"/>
+              <a:t>. (4)</a:t>
+            </a:r>
+          </a:p>
+          <a:p>
+            <a:pPr marL="45720" indent="0">
+              <a:lnSpc>
+                <a:spcPct val="120000"/>
+              </a:lnSpc>
+              <a:spcBef>
+                <a:spcPts val="0"/>
+              </a:spcBef>
+              <a:buNone/>
+            </a:pPr>
+            <a:r>
+              <a:rPr lang="en-US" sz="2100" dirty="0"/>
+              <a:t>7</a:t>
+            </a:r>
+            <a:r>
+              <a:rPr lang="en-US" sz="2100" dirty="0" smtClean="0"/>
+              <a:t>. </a:t>
+            </a:r>
+            <a:r>
+              <a:rPr lang="en-US" sz="2100" dirty="0"/>
+              <a:t>Set up desktop application </a:t>
+            </a:r>
+            <a:r>
+              <a:rPr lang="en-US" sz="2100" dirty="0" smtClean="0"/>
+              <a:t>(5a)</a:t>
+            </a:r>
+          </a:p>
+          <a:p>
+            <a:pPr marL="45720" indent="0">
+              <a:lnSpc>
+                <a:spcPct val="120000"/>
+              </a:lnSpc>
+              <a:spcBef>
+                <a:spcPts val="0"/>
+              </a:spcBef>
+              <a:buNone/>
+            </a:pPr>
+            <a:r>
+              <a:rPr lang="en-US" sz="2100" dirty="0"/>
+              <a:t>8</a:t>
+            </a:r>
+            <a:r>
+              <a:rPr lang="en-US" sz="2100" dirty="0" smtClean="0"/>
+              <a:t>. </a:t>
+            </a:r>
+            <a:r>
+              <a:rPr lang="en-US" sz="2100" dirty="0"/>
+              <a:t>Set up iOS application </a:t>
+            </a:r>
+            <a:r>
+              <a:rPr lang="en-US" sz="2100" dirty="0" smtClean="0"/>
+              <a:t>(5b)</a:t>
+            </a:r>
+          </a:p>
+          <a:p>
+            <a:pPr marL="45720" indent="0">
+              <a:lnSpc>
+                <a:spcPct val="120000"/>
+              </a:lnSpc>
+              <a:spcBef>
+                <a:spcPts val="0"/>
+              </a:spcBef>
+              <a:buNone/>
+            </a:pPr>
+            <a:r>
+              <a:rPr lang="en-US" sz="2100" dirty="0" smtClean="0"/>
+              <a:t>9</a:t>
+            </a:r>
+            <a:r>
+              <a:rPr lang="en-US" sz="2100" dirty="0"/>
+              <a:t>. Connect desktop application to </a:t>
+            </a:r>
+            <a:r>
+              <a:rPr lang="en-US" sz="2100" dirty="0" err="1"/>
+              <a:t>Kinvey</a:t>
+            </a:r>
+            <a:r>
+              <a:rPr lang="en-US" sz="2100" dirty="0"/>
+              <a:t> Database </a:t>
+            </a:r>
+            <a:r>
+              <a:rPr lang="en-US" sz="2100" dirty="0" smtClean="0"/>
+              <a:t>(6a)</a:t>
+            </a:r>
+          </a:p>
+          <a:p>
+            <a:pPr marL="45720" indent="0">
+              <a:lnSpc>
+                <a:spcPct val="120000"/>
+              </a:lnSpc>
+              <a:spcBef>
+                <a:spcPts val="0"/>
+              </a:spcBef>
+              <a:buNone/>
+            </a:pPr>
+            <a:r>
+              <a:rPr lang="en-US" sz="2100" dirty="0" smtClean="0"/>
+              <a:t>10</a:t>
+            </a:r>
+            <a:r>
+              <a:rPr lang="en-US" sz="2100" dirty="0"/>
+              <a:t>. Connect iOS application to </a:t>
+            </a:r>
+            <a:r>
+              <a:rPr lang="en-US" sz="2100" dirty="0" err="1"/>
+              <a:t>Kinvey</a:t>
+            </a:r>
+            <a:r>
+              <a:rPr lang="en-US" sz="2100" dirty="0"/>
+              <a:t> Database </a:t>
+            </a:r>
+            <a:r>
+              <a:rPr lang="en-US" sz="2100" dirty="0" smtClean="0"/>
+              <a:t>(6b)</a:t>
+            </a:r>
+          </a:p>
+          <a:p>
+            <a:pPr marL="45720" indent="0">
+              <a:lnSpc>
+                <a:spcPct val="120000"/>
+              </a:lnSpc>
+              <a:spcBef>
+                <a:spcPts val="0"/>
+              </a:spcBef>
+              <a:buNone/>
+            </a:pPr>
+            <a:r>
+              <a:rPr lang="en-US" sz="2100" dirty="0"/>
+              <a:t>11. Enter current data into database. </a:t>
+            </a:r>
+            <a:r>
+              <a:rPr lang="en-US" sz="2100" dirty="0" smtClean="0"/>
+              <a:t>(6c)</a:t>
+            </a:r>
+            <a:endParaRPr lang="en-US" sz="2100" dirty="0"/>
+          </a:p>
+          <a:p>
+            <a:pPr>
+              <a:lnSpc>
+                <a:spcPct val="120000"/>
+              </a:lnSpc>
+              <a:spcBef>
+                <a:spcPts val="0"/>
+              </a:spcBef>
+            </a:pPr>
+            <a:endParaRPr lang="en-US" dirty="0" smtClean="0"/>
+          </a:p>
+        </p:txBody>
+      </p:sp>
+      <p:sp>
+        <p:nvSpPr>
+          <p:cNvPr id="5" name="TextBox 4"/>
+          <p:cNvSpPr txBox="1"/>
+          <p:nvPr/>
+        </p:nvSpPr>
+        <p:spPr>
+          <a:xfrm>
+            <a:off x="6223000" y="1723500"/>
+            <a:ext cx="5295900" cy="3748719"/>
+          </a:xfrm>
+          <a:prstGeom prst="rect">
+            <a:avLst/>
+          </a:prstGeom>
+          <a:noFill/>
+        </p:spPr>
+        <p:txBody>
+          <a:bodyPr wrap="square" rtlCol="0">
+            <a:spAutoFit/>
+          </a:bodyPr>
           <a:lstStyle/>
           <a:p>
-            <a:endParaRPr lang="en-US"/>
-          </a:p>
-        </p:txBody>
-      </p:sp>
-      <p:sp>
-        <p:nvSpPr>
-          <p:cNvPr id="6" name="Content Placeholder 5"/>
-          <p:cNvSpPr>
-            <a:spLocks noGrp="1"/>
-          </p:cNvSpPr>
-          <p:nvPr>
-            <p:ph sz="quarter" idx="4"/>
-          </p:nvPr>
-        </p:nvSpPr>
-        <p:spPr/>
-        <p:txBody>
-          <a:bodyPr/>
+            <a:pPr>
+              <a:lnSpc>
+                <a:spcPct val="120000"/>
+              </a:lnSpc>
+              <a:spcBef>
+                <a:spcPts val="0"/>
+              </a:spcBef>
+            </a:pPr>
+            <a:r>
+              <a:rPr lang="en-US" dirty="0" smtClean="0"/>
+              <a:t>12</a:t>
+            </a:r>
+            <a:r>
+              <a:rPr lang="en-US" dirty="0"/>
+              <a:t>. Create test cases for our requirements. </a:t>
+            </a:r>
+            <a:r>
+              <a:rPr lang="en-US" dirty="0" smtClean="0"/>
+              <a:t>(7)</a:t>
+            </a:r>
+          </a:p>
+          <a:p>
+            <a:pPr>
+              <a:lnSpc>
+                <a:spcPct val="120000"/>
+              </a:lnSpc>
+              <a:spcBef>
+                <a:spcPts val="0"/>
+              </a:spcBef>
+            </a:pPr>
+            <a:r>
+              <a:rPr lang="en-US" dirty="0" smtClean="0"/>
+              <a:t>13</a:t>
+            </a:r>
+            <a:r>
+              <a:rPr lang="en-US" dirty="0"/>
+              <a:t>. Implement the requirements for the desktop application </a:t>
+            </a:r>
+            <a:r>
+              <a:rPr lang="en-US" dirty="0" smtClean="0"/>
+              <a:t>(8a)</a:t>
+            </a:r>
+          </a:p>
+          <a:p>
+            <a:pPr>
+              <a:lnSpc>
+                <a:spcPct val="120000"/>
+              </a:lnSpc>
+              <a:spcBef>
+                <a:spcPts val="0"/>
+              </a:spcBef>
+            </a:pPr>
+            <a:r>
+              <a:rPr lang="en-US" dirty="0" smtClean="0"/>
+              <a:t>14</a:t>
+            </a:r>
+            <a:r>
+              <a:rPr lang="en-US" dirty="0"/>
+              <a:t>. Implement the requirements for the iOS application </a:t>
+            </a:r>
+            <a:r>
+              <a:rPr lang="en-US" dirty="0" smtClean="0"/>
+              <a:t>(8b)</a:t>
+            </a:r>
+          </a:p>
+          <a:p>
+            <a:pPr>
+              <a:lnSpc>
+                <a:spcPct val="120000"/>
+              </a:lnSpc>
+              <a:spcBef>
+                <a:spcPts val="0"/>
+              </a:spcBef>
+            </a:pPr>
+            <a:r>
+              <a:rPr lang="en-US" dirty="0" smtClean="0"/>
+              <a:t>15</a:t>
+            </a:r>
+            <a:r>
+              <a:rPr lang="en-US" dirty="0"/>
+              <a:t>. Test our implementation </a:t>
+            </a:r>
+            <a:r>
+              <a:rPr lang="en-US" dirty="0" smtClean="0"/>
+              <a:t>(9a)</a:t>
+            </a:r>
+          </a:p>
+          <a:p>
+            <a:pPr>
+              <a:lnSpc>
+                <a:spcPct val="120000"/>
+              </a:lnSpc>
+              <a:spcBef>
+                <a:spcPts val="0"/>
+              </a:spcBef>
+            </a:pPr>
+            <a:r>
+              <a:rPr lang="en-US" dirty="0" smtClean="0"/>
+              <a:t>16</a:t>
+            </a:r>
+            <a:r>
+              <a:rPr lang="en-US" dirty="0"/>
+              <a:t>. Create Labels for the items at </a:t>
+            </a:r>
+            <a:r>
+              <a:rPr lang="en-US" dirty="0" err="1"/>
+              <a:t>Pagliai's</a:t>
+            </a:r>
+            <a:r>
+              <a:rPr lang="en-US" dirty="0"/>
+              <a:t> </a:t>
+            </a:r>
+            <a:r>
+              <a:rPr lang="en-US" dirty="0" smtClean="0"/>
+              <a:t>(9b)</a:t>
+            </a:r>
+          </a:p>
+          <a:p>
+            <a:pPr>
+              <a:lnSpc>
+                <a:spcPct val="120000"/>
+              </a:lnSpc>
+              <a:spcBef>
+                <a:spcPts val="0"/>
+              </a:spcBef>
+            </a:pPr>
+            <a:r>
+              <a:rPr lang="en-US" dirty="0" smtClean="0"/>
+              <a:t>17</a:t>
+            </a:r>
+            <a:r>
+              <a:rPr lang="en-US" dirty="0"/>
+              <a:t>. Propose working copy of system to client </a:t>
+            </a:r>
+            <a:r>
+              <a:rPr lang="en-US" dirty="0" smtClean="0"/>
+              <a:t>(10)</a:t>
+            </a:r>
+          </a:p>
+          <a:p>
+            <a:pPr>
+              <a:lnSpc>
+                <a:spcPct val="120000"/>
+              </a:lnSpc>
+              <a:spcBef>
+                <a:spcPts val="0"/>
+              </a:spcBef>
+            </a:pPr>
+            <a:r>
+              <a:rPr lang="en-US" dirty="0" smtClean="0"/>
+              <a:t>18</a:t>
+            </a:r>
+            <a:r>
+              <a:rPr lang="en-US" dirty="0"/>
+              <a:t>. Adjust system if needed </a:t>
+            </a:r>
+            <a:r>
+              <a:rPr lang="en-US" dirty="0" smtClean="0"/>
+              <a:t>(11a)</a:t>
+            </a:r>
+          </a:p>
+          <a:p>
+            <a:pPr>
+              <a:lnSpc>
+                <a:spcPct val="120000"/>
+              </a:lnSpc>
+              <a:spcBef>
+                <a:spcPts val="0"/>
+              </a:spcBef>
+            </a:pPr>
+            <a:r>
+              <a:rPr lang="en-US" dirty="0" smtClean="0"/>
+              <a:t>19</a:t>
+            </a:r>
+            <a:r>
+              <a:rPr lang="en-US" dirty="0"/>
+              <a:t>. Add additional features if time allows </a:t>
+            </a:r>
+            <a:r>
+              <a:rPr lang="en-US" dirty="0" smtClean="0"/>
+              <a:t>(11b)</a:t>
+            </a:r>
+          </a:p>
+          <a:p>
+            <a:pPr>
+              <a:lnSpc>
+                <a:spcPct val="120000"/>
+              </a:lnSpc>
+              <a:spcBef>
+                <a:spcPts val="0"/>
+              </a:spcBef>
+            </a:pPr>
+            <a:r>
+              <a:rPr lang="en-US" dirty="0" smtClean="0"/>
+              <a:t>20</a:t>
+            </a:r>
+            <a:r>
+              <a:rPr lang="en-US" dirty="0"/>
+              <a:t>. Install the system </a:t>
+            </a:r>
+            <a:r>
+              <a:rPr lang="en-US"/>
+              <a:t>on </a:t>
+            </a:r>
+            <a:r>
+              <a:rPr lang="en-US" smtClean="0"/>
+              <a:t>site (12)</a:t>
+            </a:r>
+            <a:endParaRPr lang="en-US" dirty="0"/>
+          </a:p>
+        </p:txBody>
+      </p:sp>
+      <p:sp>
+        <p:nvSpPr>
+          <p:cNvPr id="6" name="TextBox 5"/>
+          <p:cNvSpPr txBox="1"/>
+          <p:nvPr/>
+        </p:nvSpPr>
+        <p:spPr>
+          <a:xfrm>
+            <a:off x="287020" y="1320701"/>
+            <a:ext cx="1447832" cy="400110"/>
+          </a:xfrm>
+          <a:prstGeom prst="rect">
+            <a:avLst/>
+          </a:prstGeom>
+          <a:noFill/>
+        </p:spPr>
+        <p:txBody>
+          <a:bodyPr wrap="none" rtlCol="0">
+            <a:spAutoFit/>
+          </a:bodyPr>
           <a:lstStyle/>
           <a:p>
-            <a:endParaRPr lang="en-US"/>
-          </a:p>
-        </p:txBody>
-      </p:sp>
-      <p:sp>
-        <p:nvSpPr>
-          <p:cNvPr id="12" name="Content Placeholder 11"/>
-          <p:cNvSpPr>
-            <a:spLocks noGrp="1"/>
-          </p:cNvSpPr>
-          <p:nvPr>
-            <p:ph sz="half" idx="2"/>
-          </p:nvPr>
-        </p:nvSpPr>
-        <p:spPr/>
-        <p:txBody>
-          <a:bodyPr/>
+            <a:r>
+              <a:rPr lang="en-US" sz="2000" dirty="0" smtClean="0"/>
+              <a:t>Completed</a:t>
+            </a:r>
+            <a:endParaRPr lang="en-US" sz="2000" dirty="0"/>
+          </a:p>
+        </p:txBody>
+      </p:sp>
+      <p:sp>
+        <p:nvSpPr>
+          <p:cNvPr id="7" name="TextBox 6"/>
+          <p:cNvSpPr txBox="1"/>
+          <p:nvPr/>
+        </p:nvSpPr>
+        <p:spPr>
+          <a:xfrm>
+            <a:off x="6223000" y="1348275"/>
+            <a:ext cx="1459054" cy="400110"/>
+          </a:xfrm>
+          <a:prstGeom prst="rect">
+            <a:avLst/>
+          </a:prstGeom>
+          <a:noFill/>
+        </p:spPr>
+        <p:txBody>
+          <a:bodyPr wrap="none" rtlCol="0">
+            <a:spAutoFit/>
+          </a:bodyPr>
           <a:lstStyle/>
           <a:p>
-            <a:endParaRPr lang="en-US"/>
+            <a:r>
+              <a:rPr lang="en-US" sz="2000" dirty="0" smtClean="0"/>
+              <a:t>Incomplete</a:t>
+            </a:r>
+            <a:endParaRPr lang="en-US" sz="2000" dirty="0"/>
           </a:p>
         </p:txBody>
       </p:sp>
     </p:spTree>
     <p:extLst>
       <p:ext uri="{BB962C8B-B14F-4D97-AF65-F5344CB8AC3E}">
-        <p14:creationId xmlns:p14="http://schemas.microsoft.com/office/powerpoint/2010/main" val="3941871670"/>
+        <p14:creationId xmlns:p14="http://schemas.microsoft.com/office/powerpoint/2010/main" val="593486007"/>
       </p:ext>
     </p:extLst>
   </p:cSld>
   <p:clrMapOvr>
     <a:masterClrMapping/>
   </p:clrMapOvr>
-  <mc:AlternateContent xmlns:mc="http://schemas.openxmlformats.org/markup-compatibility/2006" xmlns:p14="http://schemas.microsoft.com/office/powerpoint/2010/main">
-    <mc:Choice Requires="p14">
+  <mc:AlternateContent xmlns:mc="http://schemas.openxmlformats.org/markup-compatibility/2006">
+    <mc:Choice xmlns:p14="http://schemas.microsoft.com/office/powerpoint/2010/main" Requires="p14">
       <p:transition spd="med" p14:dur="700">
         <p:fade/>
       </p:transition>
     </mc:Choice>
-    <mc:Fallback xmlns="">
+    <mc:Fallback>
       <p:transition spd="med">
         <p:fade/>
       </p:transition>

</xml_diff>

<commit_message>
updated pp, should be done
</commit_message>
<xml_diff>
--- a/Team.Supreme.pptx
+++ b/Team.Supreme.pptx
@@ -5,10 +5,10 @@
     <p:sldMasterId id="2147483648" r:id="rId2"/>
   </p:sldMasterIdLst>
   <p:notesMasterIdLst>
-    <p:notesMasterId r:id="rId15"/>
+    <p:notesMasterId r:id="rId17"/>
   </p:notesMasterIdLst>
   <p:handoutMasterIdLst>
-    <p:handoutMasterId r:id="rId16"/>
+    <p:handoutMasterId r:id="rId18"/>
   </p:handoutMasterIdLst>
   <p:sldIdLst>
     <p:sldId id="256" r:id="rId3"/>
@@ -23,6 +23,8 @@
     <p:sldId id="274" r:id="rId12"/>
     <p:sldId id="258" r:id="rId13"/>
     <p:sldId id="276" r:id="rId14"/>
+    <p:sldId id="277" r:id="rId15"/>
+    <p:sldId id="278" r:id="rId16"/>
   </p:sldIdLst>
   <p:sldSz cx="12192000" cy="6858000"/>
   <p:notesSz cx="6858000" cy="9144000"/>
@@ -225,7 +227,7 @@
           <a:p>
             <a:fld id="{FD9D2DDA-69D8-473F-A583-B6774B31A77B}" type="datetimeFigureOut">
               <a:rPr lang="en-US"/>
-              <a:t>3/7/2016</a:t>
+              <a:t>3/9/2016</a:t>
             </a:fld>
             <a:endParaRPr/>
           </a:p>
@@ -390,7 +392,7 @@
           <a:p>
             <a:fld id="{A01F6DFB-6833-46E4-B515-70E0D9178056}" type="datetimeFigureOut">
               <a:rPr lang="en-US"/>
-              <a:t>3/7/2016</a:t>
+              <a:t>3/9/2016</a:t>
             </a:fld>
             <a:endParaRPr/>
           </a:p>
@@ -1281,7 +1283,7 @@
           <a:p>
             <a:fld id="{0B277187-C200-495F-A386-621319EADA8F}" type="datetimeFigureOut">
               <a:rPr lang="en-US"/>
-              <a:t>3/7/2016</a:t>
+              <a:t>3/9/2016</a:t>
             </a:fld>
             <a:endParaRPr/>
           </a:p>
@@ -1473,7 +1475,7 @@
           <a:p>
             <a:fld id="{0B277187-C200-495F-A386-621319EADA8F}" type="datetimeFigureOut">
               <a:rPr lang="en-US"/>
-              <a:t>3/7/2016</a:t>
+              <a:t>3/9/2016</a:t>
             </a:fld>
             <a:endParaRPr/>
           </a:p>
@@ -1671,7 +1673,7 @@
           <a:p>
             <a:fld id="{0B277187-C200-495F-A386-621319EADA8F}" type="datetimeFigureOut">
               <a:rPr lang="en-US"/>
-              <a:t>3/7/2016</a:t>
+              <a:t>3/9/2016</a:t>
             </a:fld>
             <a:endParaRPr/>
           </a:p>
@@ -1982,7 +1984,7 @@
           <a:p>
             <a:fld id="{0B277187-C200-495F-A386-621319EADA8F}" type="datetimeFigureOut">
               <a:rPr lang="en-US"/>
-              <a:t>3/7/2016</a:t>
+              <a:t>3/9/2016</a:t>
             </a:fld>
             <a:endParaRPr/>
           </a:p>
@@ -2286,7 +2288,7 @@
           <a:p>
             <a:fld id="{0B277187-C200-495F-A386-621319EADA8F}" type="datetimeFigureOut">
               <a:rPr lang="en-US"/>
-              <a:t>3/7/2016</a:t>
+              <a:t>3/9/2016</a:t>
             </a:fld>
             <a:endParaRPr/>
           </a:p>
@@ -2738,7 +2740,7 @@
           <a:p>
             <a:fld id="{0B277187-C200-495F-A386-621319EADA8F}" type="datetimeFigureOut">
               <a:rPr lang="en-US"/>
-              <a:t>3/7/2016</a:t>
+              <a:t>3/9/2016</a:t>
             </a:fld>
             <a:endParaRPr/>
           </a:p>
@@ -2875,7 +2877,7 @@
           <a:p>
             <a:fld id="{0B277187-C200-495F-A386-621319EADA8F}" type="datetimeFigureOut">
               <a:rPr lang="en-US"/>
-              <a:t>3/7/2016</a:t>
+              <a:t>3/9/2016</a:t>
             </a:fld>
             <a:endParaRPr/>
           </a:p>
@@ -3121,7 +3123,7 @@
           <a:p>
             <a:fld id="{0B277187-C200-495F-A386-621319EADA8F}" type="datetimeFigureOut">
               <a:rPr lang="en-US"/>
-              <a:t>3/7/2016</a:t>
+              <a:t>3/9/2016</a:t>
             </a:fld>
             <a:endParaRPr/>
           </a:p>
@@ -3558,7 +3560,7 @@
           <a:p>
             <a:fld id="{0B277187-C200-495F-A386-621319EADA8F}" type="datetimeFigureOut">
               <a:rPr lang="en-US"/>
-              <a:t>3/7/2016</a:t>
+              <a:t>3/9/2016</a:t>
             </a:fld>
             <a:endParaRPr/>
           </a:p>
@@ -3981,7 +3983,7 @@
           <a:p>
             <a:fld id="{0B277187-C200-495F-A386-621319EADA8F}" type="datetimeFigureOut">
               <a:rPr lang="en-US"/>
-              <a:t>3/7/2016</a:t>
+              <a:t>3/9/2016</a:t>
             </a:fld>
             <a:endParaRPr/>
           </a:p>
@@ -4371,7 +4373,7 @@
             <a:fld id="{0B277187-C200-495F-A386-621319EADA8F}" type="datetimeFigureOut">
               <a:rPr lang="en-US"/>
               <a:pPr/>
-              <a:t>3/7/2016</a:t>
+              <a:t>3/9/2016</a:t>
             </a:fld>
             <a:endParaRPr/>
           </a:p>
@@ -17239,7 +17241,6 @@
               <a:rPr lang="en-US" altLang="en-US" sz="1600" dirty="0"/>
               <a:t>EM,SS,CM,JL</a:t>
             </a:r>
-            <a:endParaRPr lang="en-US" altLang="en-US" sz="1600" dirty="0"/>
           </a:p>
         </p:txBody>
       </p:sp>
@@ -17602,7 +17603,6 @@
               <a:rPr lang="en-US" altLang="en-US" sz="1600" dirty="0"/>
               <a:t>EM,SS,CM,JL</a:t>
             </a:r>
-            <a:endParaRPr lang="en-US" altLang="en-US" sz="1600" dirty="0"/>
           </a:p>
         </p:txBody>
       </p:sp>
@@ -18503,6 +18503,184 @@
       </p:par>
     </p:tnLst>
   </p:timing>
+</p:sld>
+</file>
+
+<file path=ppt/slides/slide13.xml><?xml version="1.0" encoding="utf-8"?>
+<p:sld xmlns:a="http://schemas.openxmlformats.org/drawingml/2006/main" xmlns:r="http://schemas.openxmlformats.org/officeDocument/2006/relationships" xmlns:p="http://schemas.openxmlformats.org/presentationml/2006/main">
+  <p:cSld>
+    <p:spTree>
+      <p:nvGrpSpPr>
+        <p:cNvPr id="1" name=""/>
+        <p:cNvGrpSpPr/>
+        <p:nvPr/>
+      </p:nvGrpSpPr>
+      <p:grpSpPr>
+        <a:xfrm>
+          <a:off x="0" y="0"/>
+          <a:ext cx="0" cy="0"/>
+          <a:chOff x="0" y="0"/>
+          <a:chExt cx="0" cy="0"/>
+        </a:xfrm>
+      </p:grpSpPr>
+      <p:sp>
+        <p:nvSpPr>
+          <p:cNvPr id="2" name="Title 1"/>
+          <p:cNvSpPr>
+            <a:spLocks noGrp="1"/>
+          </p:cNvSpPr>
+          <p:nvPr>
+            <p:ph type="title"/>
+          </p:nvPr>
+        </p:nvSpPr>
+        <p:spPr>
+          <a:xfrm>
+            <a:off x="1295400" y="1067871"/>
+            <a:ext cx="9601200" cy="2359152"/>
+          </a:xfrm>
+        </p:spPr>
+        <p:txBody>
+          <a:bodyPr/>
+          <a:lstStyle/>
+          <a:p>
+            <a:r>
+              <a:rPr lang="en-US" dirty="0" smtClean="0"/>
+              <a:t>Demo</a:t>
+            </a:r>
+            <a:endParaRPr lang="en-US" dirty="0"/>
+          </a:p>
+        </p:txBody>
+      </p:sp>
+      <p:sp>
+        <p:nvSpPr>
+          <p:cNvPr id="3" name="Text Placeholder 2"/>
+          <p:cNvSpPr>
+            <a:spLocks noGrp="1"/>
+          </p:cNvSpPr>
+          <p:nvPr>
+            <p:ph type="body" idx="1"/>
+          </p:nvPr>
+        </p:nvSpPr>
+        <p:spPr/>
+        <p:txBody>
+          <a:bodyPr/>
+          <a:lstStyle/>
+          <a:p>
+            <a:endParaRPr lang="en-US"/>
+          </a:p>
+        </p:txBody>
+      </p:sp>
+    </p:spTree>
+    <p:extLst>
+      <p:ext uri="{BB962C8B-B14F-4D97-AF65-F5344CB8AC3E}">
+        <p14:creationId xmlns:p14="http://schemas.microsoft.com/office/powerpoint/2010/main" val="1355520903"/>
+      </p:ext>
+    </p:extLst>
+  </p:cSld>
+  <p:clrMapOvr>
+    <a:masterClrMapping/>
+  </p:clrMapOvr>
+  <mc:AlternateContent xmlns:mc="http://schemas.openxmlformats.org/markup-compatibility/2006" xmlns:p14="http://schemas.microsoft.com/office/powerpoint/2010/main">
+    <mc:Choice Requires="p14">
+      <p:transition spd="med" p14:dur="700">
+        <p:fade/>
+      </p:transition>
+    </mc:Choice>
+    <mc:Fallback xmlns="">
+      <p:transition spd="med">
+        <p:fade/>
+      </p:transition>
+    </mc:Fallback>
+  </mc:AlternateContent>
+</p:sld>
+</file>
+
+<file path=ppt/slides/slide14.xml><?xml version="1.0" encoding="utf-8"?>
+<p:sld xmlns:a="http://schemas.openxmlformats.org/drawingml/2006/main" xmlns:r="http://schemas.openxmlformats.org/officeDocument/2006/relationships" xmlns:p="http://schemas.openxmlformats.org/presentationml/2006/main">
+  <p:cSld>
+    <p:spTree>
+      <p:nvGrpSpPr>
+        <p:cNvPr id="1" name=""/>
+        <p:cNvGrpSpPr/>
+        <p:nvPr/>
+      </p:nvGrpSpPr>
+      <p:grpSpPr>
+        <a:xfrm>
+          <a:off x="0" y="0"/>
+          <a:ext cx="0" cy="0"/>
+          <a:chOff x="0" y="0"/>
+          <a:chExt cx="0" cy="0"/>
+        </a:xfrm>
+      </p:grpSpPr>
+      <p:sp>
+        <p:nvSpPr>
+          <p:cNvPr id="2" name="Title 1"/>
+          <p:cNvSpPr>
+            <a:spLocks noGrp="1"/>
+          </p:cNvSpPr>
+          <p:nvPr>
+            <p:ph type="title"/>
+          </p:nvPr>
+        </p:nvSpPr>
+        <p:spPr>
+          <a:xfrm>
+            <a:off x="1295400" y="878401"/>
+            <a:ext cx="9601200" cy="2359152"/>
+          </a:xfrm>
+        </p:spPr>
+        <p:txBody>
+          <a:bodyPr/>
+          <a:lstStyle/>
+          <a:p>
+            <a:r>
+              <a:rPr lang="en-US" dirty="0" smtClean="0"/>
+              <a:t>Questions?</a:t>
+            </a:r>
+            <a:endParaRPr lang="en-US" dirty="0"/>
+          </a:p>
+        </p:txBody>
+      </p:sp>
+      <p:sp>
+        <p:nvSpPr>
+          <p:cNvPr id="3" name="Text Placeholder 2"/>
+          <p:cNvSpPr>
+            <a:spLocks noGrp="1"/>
+          </p:cNvSpPr>
+          <p:nvPr>
+            <p:ph type="body" idx="1"/>
+          </p:nvPr>
+        </p:nvSpPr>
+        <p:spPr/>
+        <p:txBody>
+          <a:bodyPr/>
+          <a:lstStyle/>
+          <a:p>
+            <a:endParaRPr lang="en-US"/>
+          </a:p>
+        </p:txBody>
+      </p:sp>
+    </p:spTree>
+    <p:extLst>
+      <p:ext uri="{BB962C8B-B14F-4D97-AF65-F5344CB8AC3E}">
+        <p14:creationId xmlns:p14="http://schemas.microsoft.com/office/powerpoint/2010/main" val="1522444124"/>
+      </p:ext>
+    </p:extLst>
+  </p:cSld>
+  <p:clrMapOvr>
+    <a:masterClrMapping/>
+  </p:clrMapOvr>
+  <mc:AlternateContent xmlns:mc="http://schemas.openxmlformats.org/markup-compatibility/2006" xmlns:p14="http://schemas.microsoft.com/office/powerpoint/2010/main">
+    <mc:Choice Requires="p14">
+      <p:transition spd="med" p14:dur="700">
+        <p:fade/>
+      </p:transition>
+    </mc:Choice>
+    <mc:Fallback xmlns="">
+      <p:transition spd="med">
+        <p:fade/>
+      </p:transition>
+    </mc:Fallback>
+  </mc:AlternateContent>
 </p:sld>
 </file>
 
@@ -19308,7 +19486,7 @@
           <a:graphicData uri="http://schemas.openxmlformats.org/presentationml/2006/ole">
             <mc:AlternateContent xmlns:mc="http://schemas.openxmlformats.org/markup-compatibility/2006">
               <mc:Choice xmlns:v="urn:schemas-microsoft-com:vml" Requires="v">
-                <p:oleObj spid="_x0000_s1059" name="Visio" r:id="rId4" imgW="5934110" imgH="6762646" progId="Visio.Drawing.15">
+                <p:oleObj spid="_x0000_s1061" name="Visio" r:id="rId4" imgW="5934110" imgH="6762646" progId="Visio.Drawing.15">
                   <p:embed/>
                 </p:oleObj>
               </mc:Choice>
@@ -19584,7 +19762,7 @@
           <a:graphicData uri="http://schemas.openxmlformats.org/presentationml/2006/ole">
             <mc:AlternateContent xmlns:mc="http://schemas.openxmlformats.org/markup-compatibility/2006">
               <mc:Choice xmlns:v="urn:schemas-microsoft-com:vml" Requires="v">
-                <p:oleObj spid="_x0000_s2077" name="Visio" r:id="rId3" imgW="7219839" imgH="3066985" progId="Visio.Drawing.15">
+                <p:oleObj spid="_x0000_s2079" name="Visio" r:id="rId3" imgW="7219839" imgH="3066985" progId="Visio.Drawing.15">
                   <p:embed/>
                 </p:oleObj>
               </mc:Choice>

</xml_diff>